<commit_message>
added covid infection number dataframe and powerpoint has 2 new slides
</commit_message>
<xml_diff>
--- a/BigData_Pr_Pres.pptx
+++ b/BigData_Pr_Pres.pptx
@@ -13,13 +13,16 @@
     <p:sldId id="262" r:id="rId7"/>
     <p:sldId id="263" r:id="rId8"/>
     <p:sldId id="264" r:id="rId9"/>
-    <p:sldId id="260" r:id="rId10"/>
-    <p:sldId id="269" r:id="rId11"/>
-    <p:sldId id="261" r:id="rId12"/>
-    <p:sldId id="266" r:id="rId13"/>
-    <p:sldId id="268" r:id="rId14"/>
-    <p:sldId id="270" r:id="rId15"/>
-    <p:sldId id="271" r:id="rId16"/>
+    <p:sldId id="272" r:id="rId10"/>
+    <p:sldId id="273" r:id="rId11"/>
+    <p:sldId id="274" r:id="rId12"/>
+    <p:sldId id="260" r:id="rId13"/>
+    <p:sldId id="269" r:id="rId14"/>
+    <p:sldId id="261" r:id="rId15"/>
+    <p:sldId id="266" r:id="rId16"/>
+    <p:sldId id="268" r:id="rId17"/>
+    <p:sldId id="270" r:id="rId18"/>
+    <p:sldId id="271" r:id="rId19"/>
   </p:sldIdLst>
   <p:sldSz cx="12192000" cy="6858000"/>
   <p:notesSz cx="6858000" cy="9144000"/>
@@ -118,6 +121,11 @@
       </a:defRPr>
     </a:lvl9pPr>
   </p:defaultTextStyle>
+  <p:extLst>
+    <p:ext uri="{EFAFB233-063F-42B5-8137-9DF3F51BA10A}">
+      <p15:sldGuideLst xmlns:p15="http://schemas.microsoft.com/office/powerpoint/2012/main"/>
+    </p:ext>
+  </p:extLst>
 </p:presentation>
 </file>
 
@@ -4642,7 +4650,7 @@
           <a:noFill/>
           <a:ln>
             <a:solidFill>
-              <a:srgbClr val="FBB367"/>
+              <a:srgbClr val="FE86E6"/>
             </a:solidFill>
           </a:ln>
         </p:spPr>
@@ -4739,7 +4747,7 @@
           <p:cNvPr id="5" name="Inhaltsplatzhalter 4">
             <a:extLst>
               <a:ext uri="{FF2B5EF4-FFF2-40B4-BE49-F238E27FC236}">
-                <a16:creationId xmlns:a16="http://schemas.microsoft.com/office/drawing/2014/main" id="{B8833675-B015-5F41-47F0-C3FF41D5045B}"/>
+                <a16:creationId xmlns:a16="http://schemas.microsoft.com/office/drawing/2014/main" id="{6BBB5BA7-8B58-95C6-DD3B-66EAA1ADD2D6}"/>
               </a:ext>
             </a:extLst>
           </p:cNvPr>
@@ -4758,8 +4766,8 @@
         </p:blipFill>
         <p:spPr>
           <a:xfrm>
-            <a:off x="1120477" y="1584984"/>
-            <a:ext cx="9951041" cy="3681886"/>
+            <a:off x="1120477" y="1199382"/>
+            <a:ext cx="9951041" cy="4453090"/>
           </a:xfrm>
           <a:prstGeom prst="rect">
             <a:avLst/>
@@ -4769,7 +4777,7 @@
     </p:spTree>
     <p:extLst>
       <p:ext uri="{BB962C8B-B14F-4D97-AF65-F5344CB8AC3E}">
-        <p14:creationId xmlns:p14="http://schemas.microsoft.com/office/powerpoint/2010/main" val="3004782944"/>
+        <p14:creationId xmlns:p14="http://schemas.microsoft.com/office/powerpoint/2010/main" val="1114305170"/>
       </p:ext>
     </p:extLst>
   </p:cSld>
@@ -4780,630 +4788,6 @@
 </file>
 
 <file path=ppt/slides/slide11.xml><?xml version="1.0" encoding="utf-8"?>
-<p:sld xmlns:a="http://schemas.openxmlformats.org/drawingml/2006/main" xmlns:r="http://schemas.openxmlformats.org/officeDocument/2006/relationships" xmlns:p="http://schemas.openxmlformats.org/presentationml/2006/main">
-  <p:cSld>
-    <p:bg>
-      <p:bgPr>
-        <a:solidFill>
-          <a:schemeClr val="bg1"/>
-        </a:solidFill>
-        <a:effectLst/>
-      </p:bgPr>
-    </p:bg>
-    <p:spTree>
-      <p:nvGrpSpPr>
-        <p:cNvPr id="1" name=""/>
-        <p:cNvGrpSpPr/>
-        <p:nvPr/>
-      </p:nvGrpSpPr>
-      <p:grpSpPr>
-        <a:xfrm>
-          <a:off x="0" y="0"/>
-          <a:ext cx="0" cy="0"/>
-          <a:chOff x="0" y="0"/>
-          <a:chExt cx="0" cy="0"/>
-        </a:xfrm>
-      </p:grpSpPr>
-      <p:sp>
-        <p:nvSpPr>
-          <p:cNvPr id="2077" name="Rectangle 2063">
-            <a:extLst>
-              <a:ext uri="{FF2B5EF4-FFF2-40B4-BE49-F238E27FC236}">
-                <a16:creationId xmlns:a16="http://schemas.microsoft.com/office/drawing/2014/main" id="{E6C8E6EB-4C59-429B-97E4-72A058CFC4FB}"/>
-              </a:ext>
-              <a:ext uri="{C183D7F6-B498-43B3-948B-1728B52AA6E4}">
-                <adec:decorative xmlns:adec="http://schemas.microsoft.com/office/drawing/2017/decorative" val="1"/>
-              </a:ext>
-            </a:extLst>
-          </p:cNvPr>
-          <p:cNvSpPr>
-            <a:spLocks noGrp="1" noRot="1" noChangeAspect="1" noMove="1" noResize="1" noEditPoints="1" noAdjustHandles="1" noChangeArrowheads="1" noChangeShapeType="1" noTextEdit="1"/>
-          </p:cNvSpPr>
-          <p:nvPr>
-            <p:extLst>
-              <p:ext uri="{386F3935-93C4-4BCD-93E2-E3B085C9AB24}">
-                <p16:designElem xmlns:p16="http://schemas.microsoft.com/office/powerpoint/2015/main" val="1"/>
-              </p:ext>
-            </p:extLst>
-          </p:nvPr>
-        </p:nvSpPr>
-        <p:spPr>
-          <a:xfrm>
-            <a:off x="446534" y="457200"/>
-            <a:ext cx="3703320" cy="94997"/>
-          </a:xfrm>
-          <a:prstGeom prst="rect">
-            <a:avLst/>
-          </a:prstGeom>
-          <a:solidFill>
-            <a:srgbClr val="465359"/>
-          </a:solidFill>
-          <a:ln>
-            <a:noFill/>
-          </a:ln>
-          <a:effectLst/>
-        </p:spPr>
-        <p:style>
-          <a:lnRef idx="1">
-            <a:schemeClr val="accent1"/>
-          </a:lnRef>
-          <a:fillRef idx="3">
-            <a:schemeClr val="accent1"/>
-          </a:fillRef>
-          <a:effectRef idx="2">
-            <a:schemeClr val="accent1"/>
-          </a:effectRef>
-          <a:fontRef idx="minor">
-            <a:schemeClr val="lt1"/>
-          </a:fontRef>
-        </p:style>
-      </p:sp>
-      <p:sp>
-        <p:nvSpPr>
-          <p:cNvPr id="2079" name="Rectangle 2065">
-            <a:extLst>
-              <a:ext uri="{FF2B5EF4-FFF2-40B4-BE49-F238E27FC236}">
-                <a16:creationId xmlns:a16="http://schemas.microsoft.com/office/drawing/2014/main" id="{B5B90362-AFCC-46A9-B41C-A257A8C5B314}"/>
-              </a:ext>
-              <a:ext uri="{C183D7F6-B498-43B3-948B-1728B52AA6E4}">
-                <adec:decorative xmlns:adec="http://schemas.microsoft.com/office/drawing/2017/decorative" val="1"/>
-              </a:ext>
-            </a:extLst>
-          </p:cNvPr>
-          <p:cNvSpPr>
-            <a:spLocks noGrp="1" noRot="1" noChangeAspect="1" noMove="1" noResize="1" noEditPoints="1" noAdjustHandles="1" noChangeArrowheads="1" noChangeShapeType="1" noTextEdit="1"/>
-          </p:cNvSpPr>
-          <p:nvPr>
-            <p:extLst>
-              <p:ext uri="{386F3935-93C4-4BCD-93E2-E3B085C9AB24}">
-                <p16:designElem xmlns:p16="http://schemas.microsoft.com/office/powerpoint/2015/main" val="1"/>
-              </p:ext>
-            </p:extLst>
-          </p:nvPr>
-        </p:nvSpPr>
-        <p:spPr>
-          <a:xfrm>
-            <a:off x="8042147" y="453643"/>
-            <a:ext cx="3703320" cy="98554"/>
-          </a:xfrm>
-          <a:prstGeom prst="rect">
-            <a:avLst/>
-          </a:prstGeom>
-          <a:solidFill>
-            <a:srgbClr val="969FA7"/>
-          </a:solidFill>
-          <a:ln>
-            <a:noFill/>
-          </a:ln>
-          <a:effectLst/>
-        </p:spPr>
-        <p:style>
-          <a:lnRef idx="1">
-            <a:schemeClr val="accent1"/>
-          </a:lnRef>
-          <a:fillRef idx="3">
-            <a:schemeClr val="accent1"/>
-          </a:fillRef>
-          <a:effectRef idx="2">
-            <a:schemeClr val="accent1"/>
-          </a:effectRef>
-          <a:fontRef idx="minor">
-            <a:schemeClr val="lt1"/>
-          </a:fontRef>
-        </p:style>
-      </p:sp>
-      <p:sp>
-        <p:nvSpPr>
-          <p:cNvPr id="2081" name="Rectangle 2067">
-            <a:extLst>
-              <a:ext uri="{FF2B5EF4-FFF2-40B4-BE49-F238E27FC236}">
-                <a16:creationId xmlns:a16="http://schemas.microsoft.com/office/drawing/2014/main" id="{F71EF7F1-38BA-471D-8CD4-2A9AE8E35527}"/>
-              </a:ext>
-              <a:ext uri="{C183D7F6-B498-43B3-948B-1728B52AA6E4}">
-                <adec:decorative xmlns:adec="http://schemas.microsoft.com/office/drawing/2017/decorative" val="1"/>
-              </a:ext>
-            </a:extLst>
-          </p:cNvPr>
-          <p:cNvSpPr>
-            <a:spLocks noGrp="1" noRot="1" noChangeAspect="1" noMove="1" noResize="1" noEditPoints="1" noAdjustHandles="1" noChangeArrowheads="1" noChangeShapeType="1" noTextEdit="1"/>
-          </p:cNvSpPr>
-          <p:nvPr>
-            <p:extLst>
-              <p:ext uri="{386F3935-93C4-4BCD-93E2-E3B085C9AB24}">
-                <p16:designElem xmlns:p16="http://schemas.microsoft.com/office/powerpoint/2015/main" val="1"/>
-              </p:ext>
-            </p:extLst>
-          </p:nvPr>
-        </p:nvSpPr>
-        <p:spPr>
-          <a:xfrm>
-            <a:off x="4241830" y="457200"/>
-            <a:ext cx="3703320" cy="91440"/>
-          </a:xfrm>
-          <a:prstGeom prst="rect">
-            <a:avLst/>
-          </a:prstGeom>
-          <a:solidFill>
-            <a:schemeClr val="accent1"/>
-          </a:solidFill>
-          <a:ln>
-            <a:noFill/>
-          </a:ln>
-          <a:effectLst/>
-        </p:spPr>
-        <p:style>
-          <a:lnRef idx="1">
-            <a:schemeClr val="accent1"/>
-          </a:lnRef>
-          <a:fillRef idx="3">
-            <a:schemeClr val="accent1"/>
-          </a:fillRef>
-          <a:effectRef idx="2">
-            <a:schemeClr val="accent1"/>
-          </a:effectRef>
-          <a:fontRef idx="minor">
-            <a:schemeClr val="lt1"/>
-          </a:fontRef>
-        </p:style>
-      </p:sp>
-      <p:sp>
-        <p:nvSpPr>
-          <p:cNvPr id="2082" name="Rectangle 2069">
-            <a:extLst>
-              <a:ext uri="{FF2B5EF4-FFF2-40B4-BE49-F238E27FC236}">
-                <a16:creationId xmlns:a16="http://schemas.microsoft.com/office/drawing/2014/main" id="{C0524398-BFB4-4C4A-8317-83B8729F9B26}"/>
-              </a:ext>
-              <a:ext uri="{C183D7F6-B498-43B3-948B-1728B52AA6E4}">
-                <adec:decorative xmlns:adec="http://schemas.microsoft.com/office/drawing/2017/decorative" val="1"/>
-              </a:ext>
-            </a:extLst>
-          </p:cNvPr>
-          <p:cNvSpPr>
-            <a:spLocks noGrp="1" noRot="1" noChangeAspect="1" noMove="1" noResize="1" noEditPoints="1" noAdjustHandles="1" noChangeArrowheads="1" noChangeShapeType="1" noTextEdit="1"/>
-          </p:cNvSpPr>
-          <p:nvPr>
-            <p:extLst>
-              <p:ext uri="{386F3935-93C4-4BCD-93E2-E3B085C9AB24}">
-                <p16:designElem xmlns:p16="http://schemas.microsoft.com/office/powerpoint/2015/main" val="1"/>
-              </p:ext>
-            </p:extLst>
-          </p:nvPr>
-        </p:nvSpPr>
-        <p:spPr>
-          <a:xfrm>
-            <a:off x="446534" y="3085764"/>
-            <a:ext cx="11298932" cy="3338149"/>
-          </a:xfrm>
-          <a:prstGeom prst="rect">
-            <a:avLst/>
-          </a:prstGeom>
-          <a:solidFill>
-            <a:srgbClr val="465359"/>
-          </a:solidFill>
-          <a:ln>
-            <a:noFill/>
-          </a:ln>
-          <a:effectLst/>
-        </p:spPr>
-        <p:style>
-          <a:lnRef idx="1">
-            <a:schemeClr val="accent1"/>
-          </a:lnRef>
-          <a:fillRef idx="3">
-            <a:schemeClr val="accent1"/>
-          </a:fillRef>
-          <a:effectRef idx="2">
-            <a:schemeClr val="accent1"/>
-          </a:effectRef>
-          <a:fontRef idx="minor">
-            <a:schemeClr val="lt1"/>
-          </a:fontRef>
-        </p:style>
-      </p:sp>
-      <p:sp useBgFill="1">
-        <p:nvSpPr>
-          <p:cNvPr id="2083" name="Rectangle 2071">
-            <a:extLst>
-              <a:ext uri="{FF2B5EF4-FFF2-40B4-BE49-F238E27FC236}">
-                <a16:creationId xmlns:a16="http://schemas.microsoft.com/office/drawing/2014/main" id="{26B4480E-B7FF-4481-890E-043A69AE6FE2}"/>
-              </a:ext>
-              <a:ext uri="{C183D7F6-B498-43B3-948B-1728B52AA6E4}">
-                <adec:decorative xmlns:adec="http://schemas.microsoft.com/office/drawing/2017/decorative" val="1"/>
-              </a:ext>
-            </a:extLst>
-          </p:cNvPr>
-          <p:cNvSpPr>
-            <a:spLocks noGrp="1" noRot="1" noChangeAspect="1" noMove="1" noResize="1" noEditPoints="1" noAdjustHandles="1" noChangeArrowheads="1" noChangeShapeType="1" noTextEdit="1"/>
-          </p:cNvSpPr>
-          <p:nvPr>
-            <p:extLst>
-              <p:ext uri="{386F3935-93C4-4BCD-93E2-E3B085C9AB24}">
-                <p16:designElem xmlns:p16="http://schemas.microsoft.com/office/powerpoint/2015/main" val="1"/>
-              </p:ext>
-            </p:extLst>
-          </p:nvPr>
-        </p:nvSpPr>
-        <p:spPr>
-          <a:xfrm>
-            <a:off x="0" y="0"/>
-            <a:ext cx="12192000" cy="6858000"/>
-          </a:xfrm>
-          <a:prstGeom prst="rect">
-            <a:avLst/>
-          </a:prstGeom>
-          <a:ln>
-            <a:noFill/>
-          </a:ln>
-        </p:spPr>
-        <p:style>
-          <a:lnRef idx="2">
-            <a:schemeClr val="accent1">
-              <a:shade val="50000"/>
-            </a:schemeClr>
-          </a:lnRef>
-          <a:fillRef idx="1">
-            <a:schemeClr val="accent1"/>
-          </a:fillRef>
-          <a:effectRef idx="0">
-            <a:schemeClr val="accent1"/>
-          </a:effectRef>
-          <a:fontRef idx="minor">
-            <a:schemeClr val="lt1"/>
-          </a:fontRef>
-        </p:style>
-        <p:txBody>
-          <a:bodyPr rtlCol="0" anchor="ctr"/>
-          <a:lstStyle/>
-          <a:p>
-            <a:pPr algn="ctr"/>
-            <a:endParaRPr lang="en-US"/>
-          </a:p>
-        </p:txBody>
-      </p:sp>
-      <p:pic>
-        <p:nvPicPr>
-          <p:cNvPr id="2050" name="Picture 2" descr="League of Legends (LoL) - wymagania na PC | Eurogamer.pl">
-            <a:extLst>
-              <a:ext uri="{FF2B5EF4-FFF2-40B4-BE49-F238E27FC236}">
-                <a16:creationId xmlns:a16="http://schemas.microsoft.com/office/drawing/2014/main" id="{DD20B372-8E75-B6FE-3B3A-7D6CF61B1540}"/>
-              </a:ext>
-            </a:extLst>
-          </p:cNvPr>
-          <p:cNvPicPr>
-            <a:picLocks noGrp="1" noChangeAspect="1" noChangeArrowheads="1"/>
-          </p:cNvPicPr>
-          <p:nvPr>
-            <p:ph idx="1"/>
-          </p:nvPr>
-        </p:nvPicPr>
-        <p:blipFill rotWithShape="1">
-          <a:blip r:embed="rId2">
-            <a:extLst>
-              <a:ext uri="{28A0092B-C50C-407E-A947-70E740481C1C}">
-                <a14:useLocalDpi xmlns:a14="http://schemas.microsoft.com/office/drawing/2010/main" val="0"/>
-              </a:ext>
-            </a:extLst>
-          </a:blip>
-          <a:srcRect/>
-          <a:stretch/>
-        </p:blipFill>
-        <p:spPr bwMode="auto">
-          <a:xfrm>
-            <a:off x="0" y="0"/>
-            <a:ext cx="12192000" cy="6858000"/>
-          </a:xfrm>
-          <a:prstGeom prst="rect">
-            <a:avLst/>
-          </a:prstGeom>
-          <a:noFill/>
-          <a:extLst>
-            <a:ext uri="{909E8E84-426E-40DD-AFC4-6F175D3DCCD1}">
-              <a14:hiddenFill xmlns:a14="http://schemas.microsoft.com/office/drawing/2010/main">
-                <a:solidFill>
-                  <a:srgbClr val="FFFFFF"/>
-                </a:solidFill>
-              </a14:hiddenFill>
-            </a:ext>
-          </a:extLst>
-        </p:spPr>
-      </p:pic>
-      <p:sp>
-        <p:nvSpPr>
-          <p:cNvPr id="2084" name="Rectangle 2073">
-            <a:extLst>
-              <a:ext uri="{FF2B5EF4-FFF2-40B4-BE49-F238E27FC236}">
-                <a16:creationId xmlns:a16="http://schemas.microsoft.com/office/drawing/2014/main" id="{64C13BAB-7C00-4D21-A857-E3D41C0A2A66}"/>
-              </a:ext>
-              <a:ext uri="{C183D7F6-B498-43B3-948B-1728B52AA6E4}">
-                <adec:decorative xmlns:adec="http://schemas.microsoft.com/office/drawing/2017/decorative" val="1"/>
-              </a:ext>
-            </a:extLst>
-          </p:cNvPr>
-          <p:cNvSpPr>
-            <a:spLocks noGrp="1" noRot="1" noChangeAspect="1" noMove="1" noResize="1" noEditPoints="1" noAdjustHandles="1" noChangeArrowheads="1" noChangeShapeType="1" noTextEdit="1"/>
-          </p:cNvSpPr>
-          <p:nvPr>
-            <p:extLst>
-              <p:ext uri="{386F3935-93C4-4BCD-93E2-E3B085C9AB24}">
-                <p16:designElem xmlns:p16="http://schemas.microsoft.com/office/powerpoint/2015/main" val="1"/>
-              </p:ext>
-            </p:extLst>
-          </p:nvPr>
-        </p:nvSpPr>
-        <p:spPr>
-          <a:xfrm>
-            <a:off x="7734797" y="1661699"/>
-            <a:ext cx="3703320" cy="94997"/>
-          </a:xfrm>
-          <a:prstGeom prst="rect">
-            <a:avLst/>
-          </a:prstGeom>
-          <a:solidFill>
-            <a:schemeClr val="tx1">
-              <a:alpha val="50000"/>
-            </a:schemeClr>
-          </a:solidFill>
-          <a:ln>
-            <a:noFill/>
-          </a:ln>
-          <a:effectLst/>
-        </p:spPr>
-        <p:style>
-          <a:lnRef idx="1">
-            <a:schemeClr val="accent1"/>
-          </a:lnRef>
-          <a:fillRef idx="3">
-            <a:schemeClr val="accent1"/>
-          </a:fillRef>
-          <a:effectRef idx="2">
-            <a:schemeClr val="accent1"/>
-          </a:effectRef>
-          <a:fontRef idx="minor">
-            <a:schemeClr val="lt1"/>
-          </a:fontRef>
-        </p:style>
-      </p:sp>
-      <p:sp>
-        <p:nvSpPr>
-          <p:cNvPr id="2076" name="Rectangle 2075">
-            <a:extLst>
-              <a:ext uri="{FF2B5EF4-FFF2-40B4-BE49-F238E27FC236}">
-                <a16:creationId xmlns:a16="http://schemas.microsoft.com/office/drawing/2014/main" id="{ECA7E90F-7383-4A8D-B3B2-977D30D27076}"/>
-              </a:ext>
-              <a:ext uri="{C183D7F6-B498-43B3-948B-1728B52AA6E4}">
-                <adec:decorative xmlns:adec="http://schemas.microsoft.com/office/drawing/2017/decorative" val="1"/>
-              </a:ext>
-            </a:extLst>
-          </p:cNvPr>
-          <p:cNvSpPr>
-            <a:spLocks noGrp="1" noRot="1" noChangeAspect="1" noMove="1" noResize="1" noEditPoints="1" noAdjustHandles="1" noChangeArrowheads="1" noChangeShapeType="1" noTextEdit="1"/>
-          </p:cNvSpPr>
-          <p:nvPr>
-            <p:extLst>
-              <p:ext uri="{386F3935-93C4-4BCD-93E2-E3B085C9AB24}">
-                <p16:designElem xmlns:p16="http://schemas.microsoft.com/office/powerpoint/2015/main" val="1"/>
-              </p:ext>
-            </p:extLst>
-          </p:nvPr>
-        </p:nvSpPr>
-        <p:spPr>
-          <a:xfrm>
-            <a:off x="7734797" y="1661699"/>
-            <a:ext cx="3703320" cy="94997"/>
-          </a:xfrm>
-          <a:prstGeom prst="rect">
-            <a:avLst/>
-          </a:prstGeom>
-          <a:solidFill>
-            <a:srgbClr val="FFB53F">
-              <a:alpha val="40000"/>
-            </a:srgbClr>
-          </a:solidFill>
-          <a:ln>
-            <a:noFill/>
-          </a:ln>
-          <a:effectLst/>
-        </p:spPr>
-        <p:style>
-          <a:lnRef idx="1">
-            <a:schemeClr val="accent1"/>
-          </a:lnRef>
-          <a:fillRef idx="3">
-            <a:schemeClr val="accent1"/>
-          </a:fillRef>
-          <a:effectRef idx="2">
-            <a:schemeClr val="accent1"/>
-          </a:effectRef>
-          <a:fontRef idx="minor">
-            <a:schemeClr val="lt1"/>
-          </a:fontRef>
-        </p:style>
-      </p:sp>
-      <p:sp>
-        <p:nvSpPr>
-          <p:cNvPr id="2078" name="Rectangle 2077">
-            <a:extLst>
-              <a:ext uri="{FF2B5EF4-FFF2-40B4-BE49-F238E27FC236}">
-                <a16:creationId xmlns:a16="http://schemas.microsoft.com/office/drawing/2014/main" id="{1F1FF39A-AC3C-4066-9D4C-519AA22812EA}"/>
-              </a:ext>
-              <a:ext uri="{C183D7F6-B498-43B3-948B-1728B52AA6E4}">
-                <adec:decorative xmlns:adec="http://schemas.microsoft.com/office/drawing/2017/decorative" val="1"/>
-              </a:ext>
-            </a:extLst>
-          </p:cNvPr>
-          <p:cNvSpPr>
-            <a:spLocks noGrp="1" noRot="1" noChangeAspect="1" noMove="1" noResize="1" noEditPoints="1" noAdjustHandles="1" noChangeArrowheads="1" noChangeShapeType="1" noTextEdit="1"/>
-          </p:cNvSpPr>
-          <p:nvPr>
-            <p:extLst>
-              <p:ext uri="{386F3935-93C4-4BCD-93E2-E3B085C9AB24}">
-                <p16:designElem xmlns:p16="http://schemas.microsoft.com/office/powerpoint/2015/main" val="1"/>
-              </p:ext>
-            </p:extLst>
-          </p:nvPr>
-        </p:nvSpPr>
-        <p:spPr>
-          <a:xfrm>
-            <a:off x="7735983" y="1812471"/>
-            <a:ext cx="3702134" cy="3383831"/>
-          </a:xfrm>
-          <a:prstGeom prst="rect">
-            <a:avLst/>
-          </a:prstGeom>
-          <a:solidFill>
-            <a:schemeClr val="tx1">
-              <a:alpha val="50000"/>
-            </a:schemeClr>
-          </a:solidFill>
-          <a:ln w="6350" cmpd="sng">
-            <a:noFill/>
-          </a:ln>
-          <a:effectLst/>
-        </p:spPr>
-        <p:style>
-          <a:lnRef idx="1">
-            <a:schemeClr val="accent1"/>
-          </a:lnRef>
-          <a:fillRef idx="3">
-            <a:schemeClr val="accent1"/>
-          </a:fillRef>
-          <a:effectRef idx="2">
-            <a:schemeClr val="accent1"/>
-          </a:effectRef>
-          <a:fontRef idx="minor">
-            <a:schemeClr val="lt1"/>
-          </a:fontRef>
-        </p:style>
-      </p:sp>
-      <p:sp>
-        <p:nvSpPr>
-          <p:cNvPr id="2080" name="Rectangle 2079">
-            <a:extLst>
-              <a:ext uri="{FF2B5EF4-FFF2-40B4-BE49-F238E27FC236}">
-                <a16:creationId xmlns:a16="http://schemas.microsoft.com/office/drawing/2014/main" id="{153E7C7A-D853-434A-AA24-D8C247D80CCB}"/>
-              </a:ext>
-              <a:ext uri="{C183D7F6-B498-43B3-948B-1728B52AA6E4}">
-                <adec:decorative xmlns:adec="http://schemas.microsoft.com/office/drawing/2017/decorative" val="1"/>
-              </a:ext>
-            </a:extLst>
-          </p:cNvPr>
-          <p:cNvSpPr>
-            <a:spLocks noGrp="1" noRot="1" noChangeAspect="1" noMove="1" noResize="1" noEditPoints="1" noAdjustHandles="1" noChangeArrowheads="1" noChangeShapeType="1" noTextEdit="1"/>
-          </p:cNvSpPr>
-          <p:nvPr>
-            <p:extLst>
-              <p:ext uri="{386F3935-93C4-4BCD-93E2-E3B085C9AB24}">
-                <p16:designElem xmlns:p16="http://schemas.microsoft.com/office/powerpoint/2015/main" val="1"/>
-              </p:ext>
-            </p:extLst>
-          </p:nvPr>
-        </p:nvSpPr>
-        <p:spPr>
-          <a:xfrm>
-            <a:off x="7735983" y="1812471"/>
-            <a:ext cx="3702134" cy="3383831"/>
-          </a:xfrm>
-          <a:prstGeom prst="rect">
-            <a:avLst/>
-          </a:prstGeom>
-          <a:solidFill>
-            <a:srgbClr val="FFB53F">
-              <a:alpha val="40000"/>
-            </a:srgbClr>
-          </a:solidFill>
-          <a:ln w="6350" cmpd="sng">
-            <a:noFill/>
-          </a:ln>
-          <a:effectLst/>
-        </p:spPr>
-        <p:style>
-          <a:lnRef idx="1">
-            <a:schemeClr val="accent1"/>
-          </a:lnRef>
-          <a:fillRef idx="3">
-            <a:schemeClr val="accent1"/>
-          </a:fillRef>
-          <a:effectRef idx="2">
-            <a:schemeClr val="accent1"/>
-          </a:effectRef>
-          <a:fontRef idx="minor">
-            <a:schemeClr val="lt1"/>
-          </a:fontRef>
-        </p:style>
-      </p:sp>
-      <p:sp>
-        <p:nvSpPr>
-          <p:cNvPr id="2" name="Titel 1">
-            <a:extLst>
-              <a:ext uri="{FF2B5EF4-FFF2-40B4-BE49-F238E27FC236}">
-                <a16:creationId xmlns:a16="http://schemas.microsoft.com/office/drawing/2014/main" id="{CCAF7E6B-A2A0-8F8A-2CFB-3DDA51254A3E}"/>
-              </a:ext>
-            </a:extLst>
-          </p:cNvPr>
-          <p:cNvSpPr>
-            <a:spLocks noGrp="1"/>
-          </p:cNvSpPr>
-          <p:nvPr>
-            <p:ph type="title"/>
-          </p:nvPr>
-        </p:nvSpPr>
-        <p:spPr>
-          <a:xfrm>
-            <a:off x="7889065" y="2324906"/>
-            <a:ext cx="3403426" cy="1588698"/>
-          </a:xfrm>
-        </p:spPr>
-        <p:txBody>
-          <a:bodyPr vert="horz" lIns="91440" tIns="45720" rIns="91440" bIns="45720" rtlCol="0" anchor="b">
-            <a:normAutofit/>
-          </a:bodyPr>
-          <a:lstStyle/>
-          <a:p>
-            <a:r>
-              <a:rPr lang="en-US" sz="3600" dirty="0">
-                <a:solidFill>
-                  <a:schemeClr val="bg1"/>
-                </a:solidFill>
-              </a:rPr>
-              <a:t>League of Legends</a:t>
-            </a:r>
-          </a:p>
-        </p:txBody>
-      </p:sp>
-    </p:spTree>
-    <p:extLst>
-      <p:ext uri="{BB962C8B-B14F-4D97-AF65-F5344CB8AC3E}">
-        <p14:creationId xmlns:p14="http://schemas.microsoft.com/office/powerpoint/2010/main" val="746657196"/>
-      </p:ext>
-    </p:extLst>
-  </p:cSld>
-  <p:clrMapOvr>
-    <a:masterClrMapping/>
-  </p:clrMapOvr>
-</p:sld>
-</file>
-
-<file path=ppt/slides/slide12.xml><?xml version="1.0" encoding="utf-8"?>
 <p:sld xmlns:a="http://schemas.openxmlformats.org/drawingml/2006/main" xmlns:r="http://schemas.openxmlformats.org/officeDocument/2006/relationships" xmlns:p="http://schemas.openxmlformats.org/presentationml/2006/main">
   <p:cSld>
     <p:bg>
@@ -5447,7 +4831,7 @@
       </p:grpSpPr>
       <p:sp>
         <p:nvSpPr>
-          <p:cNvPr id="25" name="Rectangle 24">
+          <p:cNvPr id="10" name="Rectangle 9">
             <a:extLst>
               <a:ext uri="{FF2B5EF4-FFF2-40B4-BE49-F238E27FC236}">
                 <a16:creationId xmlns:a16="http://schemas.microsoft.com/office/drawing/2014/main" id="{1DDC3EF6-2EA5-44B3-94C7-9DDA67A127D0}"/>
@@ -5501,7 +4885,7 @@
       </p:sp>
       <p:sp>
         <p:nvSpPr>
-          <p:cNvPr id="27" name="Rectangle 26">
+          <p:cNvPr id="12" name="Rectangle 11">
             <a:extLst>
               <a:ext uri="{FF2B5EF4-FFF2-40B4-BE49-F238E27FC236}">
                 <a16:creationId xmlns:a16="http://schemas.microsoft.com/office/drawing/2014/main" id="{87925A9A-E9FA-496E-9C09-7C2845E0062B}"/>
@@ -5555,7 +4939,7 @@
       </p:sp>
       <p:sp>
         <p:nvSpPr>
-          <p:cNvPr id="29" name="Rectangle 28">
+          <p:cNvPr id="14" name="Rectangle 13">
             <a:extLst>
               <a:ext uri="{FF2B5EF4-FFF2-40B4-BE49-F238E27FC236}">
                 <a16:creationId xmlns:a16="http://schemas.microsoft.com/office/drawing/2014/main" id="{2073ABB4-E164-4CBF-ADFF-25552BB7913B}"/>
@@ -5609,7 +4993,7 @@
       </p:sp>
       <p:sp useBgFill="1">
         <p:nvSpPr>
-          <p:cNvPr id="31" name="Rectangle 30">
+          <p:cNvPr id="16" name="Rectangle 15">
             <a:extLst>
               <a:ext uri="{FF2B5EF4-FFF2-40B4-BE49-F238E27FC236}">
                 <a16:creationId xmlns:a16="http://schemas.microsoft.com/office/drawing/2014/main" id="{20C97E5C-C165-417B-BBDE-6701E226BE3D}"/>
@@ -5669,7 +5053,7 @@
       </p:sp>
       <p:sp>
         <p:nvSpPr>
-          <p:cNvPr id="33" name="Rectangle 32">
+          <p:cNvPr id="18" name="Rectangle 17">
             <a:extLst>
               <a:ext uri="{FF2B5EF4-FFF2-40B4-BE49-F238E27FC236}">
                 <a16:creationId xmlns:a16="http://schemas.microsoft.com/office/drawing/2014/main" id="{95D0E1C6-221C-4835-B0D4-24184F6B6E21}"/>
@@ -5701,7 +5085,7 @@
           <a:noFill/>
           <a:ln>
             <a:solidFill>
-              <a:srgbClr val="6F7DFA"/>
+              <a:srgbClr val="FE724F"/>
             </a:solidFill>
           </a:ln>
         </p:spPr>
@@ -5732,7 +5116,7 @@
       </p:sp>
       <p:sp>
         <p:nvSpPr>
-          <p:cNvPr id="35" name="Rectangle 34">
+          <p:cNvPr id="20" name="Rectangle 19">
             <a:extLst>
               <a:ext uri="{FF2B5EF4-FFF2-40B4-BE49-F238E27FC236}">
                 <a16:creationId xmlns:a16="http://schemas.microsoft.com/office/drawing/2014/main" id="{A98F2782-0AD1-4AB6-BBB8-3BA1BB416CE2}"/>
@@ -5795,10 +5179,10 @@
       </p:sp>
       <p:pic>
         <p:nvPicPr>
-          <p:cNvPr id="8" name="Inhaltsplatzhalter 7">
-            <a:extLst>
-              <a:ext uri="{FF2B5EF4-FFF2-40B4-BE49-F238E27FC236}">
-                <a16:creationId xmlns:a16="http://schemas.microsoft.com/office/drawing/2014/main" id="{F544CDCA-F8CE-F22F-C9F8-A286069D2B38}"/>
+          <p:cNvPr id="5" name="Inhaltsplatzhalter 4">
+            <a:extLst>
+              <a:ext uri="{FF2B5EF4-FFF2-40B4-BE49-F238E27FC236}">
+                <a16:creationId xmlns:a16="http://schemas.microsoft.com/office/drawing/2014/main" id="{06415AA1-5729-15A2-7F8A-A033D3C78FA0}"/>
               </a:ext>
             </a:extLst>
           </p:cNvPr>
@@ -5817,8 +5201,8 @@
         </p:blipFill>
         <p:spPr>
           <a:xfrm>
-            <a:off x="1120477" y="1584984"/>
-            <a:ext cx="9951041" cy="3681886"/>
+            <a:off x="1144600" y="1123527"/>
+            <a:ext cx="9902794" cy="4604800"/>
           </a:xfrm>
           <a:prstGeom prst="rect">
             <a:avLst/>
@@ -5828,12 +5212,636 @@
     </p:spTree>
     <p:extLst>
       <p:ext uri="{BB962C8B-B14F-4D97-AF65-F5344CB8AC3E}">
-        <p14:creationId xmlns:p14="http://schemas.microsoft.com/office/powerpoint/2010/main" val="3955068690"/>
+        <p14:creationId xmlns:p14="http://schemas.microsoft.com/office/powerpoint/2010/main" val="3494486254"/>
       </p:ext>
     </p:extLst>
   </p:cSld>
   <p:clrMapOvr>
     <a:overrideClrMapping bg1="dk1" tx1="lt1" bg2="dk2" tx2="lt2" accent1="accent1" accent2="accent2" accent3="accent3" accent4="accent4" accent5="accent5" accent6="accent6" hlink="hlink" folHlink="folHlink"/>
+  </p:clrMapOvr>
+</p:sld>
+</file>
+
+<file path=ppt/slides/slide12.xml><?xml version="1.0" encoding="utf-8"?>
+<p:sld xmlns:a="http://schemas.openxmlformats.org/drawingml/2006/main" xmlns:r="http://schemas.openxmlformats.org/officeDocument/2006/relationships" xmlns:p="http://schemas.openxmlformats.org/presentationml/2006/main">
+  <p:cSld>
+    <p:bg>
+      <p:bgPr>
+        <a:solidFill>
+          <a:schemeClr val="bg1"/>
+        </a:solidFill>
+        <a:effectLst/>
+      </p:bgPr>
+    </p:bg>
+    <p:spTree>
+      <p:nvGrpSpPr>
+        <p:cNvPr id="1" name=""/>
+        <p:cNvGrpSpPr/>
+        <p:nvPr/>
+      </p:nvGrpSpPr>
+      <p:grpSpPr>
+        <a:xfrm>
+          <a:off x="0" y="0"/>
+          <a:ext cx="0" cy="0"/>
+          <a:chOff x="0" y="0"/>
+          <a:chExt cx="0" cy="0"/>
+        </a:xfrm>
+      </p:grpSpPr>
+      <p:sp>
+        <p:nvSpPr>
+          <p:cNvPr id="2077" name="Rectangle 2063">
+            <a:extLst>
+              <a:ext uri="{FF2B5EF4-FFF2-40B4-BE49-F238E27FC236}">
+                <a16:creationId xmlns:a16="http://schemas.microsoft.com/office/drawing/2014/main" id="{E6C8E6EB-4C59-429B-97E4-72A058CFC4FB}"/>
+              </a:ext>
+              <a:ext uri="{C183D7F6-B498-43B3-948B-1728B52AA6E4}">
+                <adec:decorative xmlns:adec="http://schemas.microsoft.com/office/drawing/2017/decorative" val="1"/>
+              </a:ext>
+            </a:extLst>
+          </p:cNvPr>
+          <p:cNvSpPr>
+            <a:spLocks noGrp="1" noRot="1" noChangeAspect="1" noMove="1" noResize="1" noEditPoints="1" noAdjustHandles="1" noChangeArrowheads="1" noChangeShapeType="1" noTextEdit="1"/>
+          </p:cNvSpPr>
+          <p:nvPr>
+            <p:extLst>
+              <p:ext uri="{386F3935-93C4-4BCD-93E2-E3B085C9AB24}">
+                <p16:designElem xmlns:p16="http://schemas.microsoft.com/office/powerpoint/2015/main" val="1"/>
+              </p:ext>
+            </p:extLst>
+          </p:nvPr>
+        </p:nvSpPr>
+        <p:spPr>
+          <a:xfrm>
+            <a:off x="446534" y="457200"/>
+            <a:ext cx="3703320" cy="94997"/>
+          </a:xfrm>
+          <a:prstGeom prst="rect">
+            <a:avLst/>
+          </a:prstGeom>
+          <a:solidFill>
+            <a:srgbClr val="465359"/>
+          </a:solidFill>
+          <a:ln>
+            <a:noFill/>
+          </a:ln>
+          <a:effectLst/>
+        </p:spPr>
+        <p:style>
+          <a:lnRef idx="1">
+            <a:schemeClr val="accent1"/>
+          </a:lnRef>
+          <a:fillRef idx="3">
+            <a:schemeClr val="accent1"/>
+          </a:fillRef>
+          <a:effectRef idx="2">
+            <a:schemeClr val="accent1"/>
+          </a:effectRef>
+          <a:fontRef idx="minor">
+            <a:schemeClr val="lt1"/>
+          </a:fontRef>
+        </p:style>
+      </p:sp>
+      <p:sp>
+        <p:nvSpPr>
+          <p:cNvPr id="2079" name="Rectangle 2065">
+            <a:extLst>
+              <a:ext uri="{FF2B5EF4-FFF2-40B4-BE49-F238E27FC236}">
+                <a16:creationId xmlns:a16="http://schemas.microsoft.com/office/drawing/2014/main" id="{B5B90362-AFCC-46A9-B41C-A257A8C5B314}"/>
+              </a:ext>
+              <a:ext uri="{C183D7F6-B498-43B3-948B-1728B52AA6E4}">
+                <adec:decorative xmlns:adec="http://schemas.microsoft.com/office/drawing/2017/decorative" val="1"/>
+              </a:ext>
+            </a:extLst>
+          </p:cNvPr>
+          <p:cNvSpPr>
+            <a:spLocks noGrp="1" noRot="1" noChangeAspect="1" noMove="1" noResize="1" noEditPoints="1" noAdjustHandles="1" noChangeArrowheads="1" noChangeShapeType="1" noTextEdit="1"/>
+          </p:cNvSpPr>
+          <p:nvPr>
+            <p:extLst>
+              <p:ext uri="{386F3935-93C4-4BCD-93E2-E3B085C9AB24}">
+                <p16:designElem xmlns:p16="http://schemas.microsoft.com/office/powerpoint/2015/main" val="1"/>
+              </p:ext>
+            </p:extLst>
+          </p:nvPr>
+        </p:nvSpPr>
+        <p:spPr>
+          <a:xfrm>
+            <a:off x="8042147" y="453643"/>
+            <a:ext cx="3703320" cy="98554"/>
+          </a:xfrm>
+          <a:prstGeom prst="rect">
+            <a:avLst/>
+          </a:prstGeom>
+          <a:solidFill>
+            <a:srgbClr val="969FA7"/>
+          </a:solidFill>
+          <a:ln>
+            <a:noFill/>
+          </a:ln>
+          <a:effectLst/>
+        </p:spPr>
+        <p:style>
+          <a:lnRef idx="1">
+            <a:schemeClr val="accent1"/>
+          </a:lnRef>
+          <a:fillRef idx="3">
+            <a:schemeClr val="accent1"/>
+          </a:fillRef>
+          <a:effectRef idx="2">
+            <a:schemeClr val="accent1"/>
+          </a:effectRef>
+          <a:fontRef idx="minor">
+            <a:schemeClr val="lt1"/>
+          </a:fontRef>
+        </p:style>
+      </p:sp>
+      <p:sp>
+        <p:nvSpPr>
+          <p:cNvPr id="2081" name="Rectangle 2067">
+            <a:extLst>
+              <a:ext uri="{FF2B5EF4-FFF2-40B4-BE49-F238E27FC236}">
+                <a16:creationId xmlns:a16="http://schemas.microsoft.com/office/drawing/2014/main" id="{F71EF7F1-38BA-471D-8CD4-2A9AE8E35527}"/>
+              </a:ext>
+              <a:ext uri="{C183D7F6-B498-43B3-948B-1728B52AA6E4}">
+                <adec:decorative xmlns:adec="http://schemas.microsoft.com/office/drawing/2017/decorative" val="1"/>
+              </a:ext>
+            </a:extLst>
+          </p:cNvPr>
+          <p:cNvSpPr>
+            <a:spLocks noGrp="1" noRot="1" noChangeAspect="1" noMove="1" noResize="1" noEditPoints="1" noAdjustHandles="1" noChangeArrowheads="1" noChangeShapeType="1" noTextEdit="1"/>
+          </p:cNvSpPr>
+          <p:nvPr>
+            <p:extLst>
+              <p:ext uri="{386F3935-93C4-4BCD-93E2-E3B085C9AB24}">
+                <p16:designElem xmlns:p16="http://schemas.microsoft.com/office/powerpoint/2015/main" val="1"/>
+              </p:ext>
+            </p:extLst>
+          </p:nvPr>
+        </p:nvSpPr>
+        <p:spPr>
+          <a:xfrm>
+            <a:off x="4241830" y="457200"/>
+            <a:ext cx="3703320" cy="91440"/>
+          </a:xfrm>
+          <a:prstGeom prst="rect">
+            <a:avLst/>
+          </a:prstGeom>
+          <a:solidFill>
+            <a:schemeClr val="accent1"/>
+          </a:solidFill>
+          <a:ln>
+            <a:noFill/>
+          </a:ln>
+          <a:effectLst/>
+        </p:spPr>
+        <p:style>
+          <a:lnRef idx="1">
+            <a:schemeClr val="accent1"/>
+          </a:lnRef>
+          <a:fillRef idx="3">
+            <a:schemeClr val="accent1"/>
+          </a:fillRef>
+          <a:effectRef idx="2">
+            <a:schemeClr val="accent1"/>
+          </a:effectRef>
+          <a:fontRef idx="minor">
+            <a:schemeClr val="lt1"/>
+          </a:fontRef>
+        </p:style>
+      </p:sp>
+      <p:sp>
+        <p:nvSpPr>
+          <p:cNvPr id="2082" name="Rectangle 2069">
+            <a:extLst>
+              <a:ext uri="{FF2B5EF4-FFF2-40B4-BE49-F238E27FC236}">
+                <a16:creationId xmlns:a16="http://schemas.microsoft.com/office/drawing/2014/main" id="{C0524398-BFB4-4C4A-8317-83B8729F9B26}"/>
+              </a:ext>
+              <a:ext uri="{C183D7F6-B498-43B3-948B-1728B52AA6E4}">
+                <adec:decorative xmlns:adec="http://schemas.microsoft.com/office/drawing/2017/decorative" val="1"/>
+              </a:ext>
+            </a:extLst>
+          </p:cNvPr>
+          <p:cNvSpPr>
+            <a:spLocks noGrp="1" noRot="1" noChangeAspect="1" noMove="1" noResize="1" noEditPoints="1" noAdjustHandles="1" noChangeArrowheads="1" noChangeShapeType="1" noTextEdit="1"/>
+          </p:cNvSpPr>
+          <p:nvPr>
+            <p:extLst>
+              <p:ext uri="{386F3935-93C4-4BCD-93E2-E3B085C9AB24}">
+                <p16:designElem xmlns:p16="http://schemas.microsoft.com/office/powerpoint/2015/main" val="1"/>
+              </p:ext>
+            </p:extLst>
+          </p:nvPr>
+        </p:nvSpPr>
+        <p:spPr>
+          <a:xfrm>
+            <a:off x="446534" y="3085764"/>
+            <a:ext cx="11298932" cy="3338149"/>
+          </a:xfrm>
+          <a:prstGeom prst="rect">
+            <a:avLst/>
+          </a:prstGeom>
+          <a:solidFill>
+            <a:srgbClr val="465359"/>
+          </a:solidFill>
+          <a:ln>
+            <a:noFill/>
+          </a:ln>
+          <a:effectLst/>
+        </p:spPr>
+        <p:style>
+          <a:lnRef idx="1">
+            <a:schemeClr val="accent1"/>
+          </a:lnRef>
+          <a:fillRef idx="3">
+            <a:schemeClr val="accent1"/>
+          </a:fillRef>
+          <a:effectRef idx="2">
+            <a:schemeClr val="accent1"/>
+          </a:effectRef>
+          <a:fontRef idx="minor">
+            <a:schemeClr val="lt1"/>
+          </a:fontRef>
+        </p:style>
+      </p:sp>
+      <p:sp useBgFill="1">
+        <p:nvSpPr>
+          <p:cNvPr id="2083" name="Rectangle 2071">
+            <a:extLst>
+              <a:ext uri="{FF2B5EF4-FFF2-40B4-BE49-F238E27FC236}">
+                <a16:creationId xmlns:a16="http://schemas.microsoft.com/office/drawing/2014/main" id="{26B4480E-B7FF-4481-890E-043A69AE6FE2}"/>
+              </a:ext>
+              <a:ext uri="{C183D7F6-B498-43B3-948B-1728B52AA6E4}">
+                <adec:decorative xmlns:adec="http://schemas.microsoft.com/office/drawing/2017/decorative" val="1"/>
+              </a:ext>
+            </a:extLst>
+          </p:cNvPr>
+          <p:cNvSpPr>
+            <a:spLocks noGrp="1" noRot="1" noChangeAspect="1" noMove="1" noResize="1" noEditPoints="1" noAdjustHandles="1" noChangeArrowheads="1" noChangeShapeType="1" noTextEdit="1"/>
+          </p:cNvSpPr>
+          <p:nvPr>
+            <p:extLst>
+              <p:ext uri="{386F3935-93C4-4BCD-93E2-E3B085C9AB24}">
+                <p16:designElem xmlns:p16="http://schemas.microsoft.com/office/powerpoint/2015/main" val="1"/>
+              </p:ext>
+            </p:extLst>
+          </p:nvPr>
+        </p:nvSpPr>
+        <p:spPr>
+          <a:xfrm>
+            <a:off x="0" y="0"/>
+            <a:ext cx="12192000" cy="6858000"/>
+          </a:xfrm>
+          <a:prstGeom prst="rect">
+            <a:avLst/>
+          </a:prstGeom>
+          <a:ln>
+            <a:noFill/>
+          </a:ln>
+        </p:spPr>
+        <p:style>
+          <a:lnRef idx="2">
+            <a:schemeClr val="accent1">
+              <a:shade val="50000"/>
+            </a:schemeClr>
+          </a:lnRef>
+          <a:fillRef idx="1">
+            <a:schemeClr val="accent1"/>
+          </a:fillRef>
+          <a:effectRef idx="0">
+            <a:schemeClr val="accent1"/>
+          </a:effectRef>
+          <a:fontRef idx="minor">
+            <a:schemeClr val="lt1"/>
+          </a:fontRef>
+        </p:style>
+        <p:txBody>
+          <a:bodyPr rtlCol="0" anchor="ctr"/>
+          <a:lstStyle/>
+          <a:p>
+            <a:pPr algn="ctr"/>
+            <a:endParaRPr lang="en-US"/>
+          </a:p>
+        </p:txBody>
+      </p:sp>
+      <p:pic>
+        <p:nvPicPr>
+          <p:cNvPr id="2050" name="Picture 2" descr="League of Legends (LoL) - wymagania na PC | Eurogamer.pl">
+            <a:extLst>
+              <a:ext uri="{FF2B5EF4-FFF2-40B4-BE49-F238E27FC236}">
+                <a16:creationId xmlns:a16="http://schemas.microsoft.com/office/drawing/2014/main" id="{DD20B372-8E75-B6FE-3B3A-7D6CF61B1540}"/>
+              </a:ext>
+            </a:extLst>
+          </p:cNvPr>
+          <p:cNvPicPr>
+            <a:picLocks noGrp="1" noChangeAspect="1" noChangeArrowheads="1"/>
+          </p:cNvPicPr>
+          <p:nvPr>
+            <p:ph idx="1"/>
+          </p:nvPr>
+        </p:nvPicPr>
+        <p:blipFill rotWithShape="1">
+          <a:blip r:embed="rId2">
+            <a:extLst>
+              <a:ext uri="{28A0092B-C50C-407E-A947-70E740481C1C}">
+                <a14:useLocalDpi xmlns:a14="http://schemas.microsoft.com/office/drawing/2010/main" val="0"/>
+              </a:ext>
+            </a:extLst>
+          </a:blip>
+          <a:srcRect/>
+          <a:stretch/>
+        </p:blipFill>
+        <p:spPr bwMode="auto">
+          <a:xfrm>
+            <a:off x="0" y="0"/>
+            <a:ext cx="12192000" cy="6858000"/>
+          </a:xfrm>
+          <a:prstGeom prst="rect">
+            <a:avLst/>
+          </a:prstGeom>
+          <a:noFill/>
+          <a:extLst>
+            <a:ext uri="{909E8E84-426E-40DD-AFC4-6F175D3DCCD1}">
+              <a14:hiddenFill xmlns:a14="http://schemas.microsoft.com/office/drawing/2010/main">
+                <a:solidFill>
+                  <a:srgbClr val="FFFFFF"/>
+                </a:solidFill>
+              </a14:hiddenFill>
+            </a:ext>
+          </a:extLst>
+        </p:spPr>
+      </p:pic>
+      <p:sp>
+        <p:nvSpPr>
+          <p:cNvPr id="2084" name="Rectangle 2073">
+            <a:extLst>
+              <a:ext uri="{FF2B5EF4-FFF2-40B4-BE49-F238E27FC236}">
+                <a16:creationId xmlns:a16="http://schemas.microsoft.com/office/drawing/2014/main" id="{64C13BAB-7C00-4D21-A857-E3D41C0A2A66}"/>
+              </a:ext>
+              <a:ext uri="{C183D7F6-B498-43B3-948B-1728B52AA6E4}">
+                <adec:decorative xmlns:adec="http://schemas.microsoft.com/office/drawing/2017/decorative" val="1"/>
+              </a:ext>
+            </a:extLst>
+          </p:cNvPr>
+          <p:cNvSpPr>
+            <a:spLocks noGrp="1" noRot="1" noChangeAspect="1" noMove="1" noResize="1" noEditPoints="1" noAdjustHandles="1" noChangeArrowheads="1" noChangeShapeType="1" noTextEdit="1"/>
+          </p:cNvSpPr>
+          <p:nvPr>
+            <p:extLst>
+              <p:ext uri="{386F3935-93C4-4BCD-93E2-E3B085C9AB24}">
+                <p16:designElem xmlns:p16="http://schemas.microsoft.com/office/powerpoint/2015/main" val="1"/>
+              </p:ext>
+            </p:extLst>
+          </p:nvPr>
+        </p:nvSpPr>
+        <p:spPr>
+          <a:xfrm>
+            <a:off x="7734797" y="1661699"/>
+            <a:ext cx="3703320" cy="94997"/>
+          </a:xfrm>
+          <a:prstGeom prst="rect">
+            <a:avLst/>
+          </a:prstGeom>
+          <a:solidFill>
+            <a:schemeClr val="tx1">
+              <a:alpha val="50000"/>
+            </a:schemeClr>
+          </a:solidFill>
+          <a:ln>
+            <a:noFill/>
+          </a:ln>
+          <a:effectLst/>
+        </p:spPr>
+        <p:style>
+          <a:lnRef idx="1">
+            <a:schemeClr val="accent1"/>
+          </a:lnRef>
+          <a:fillRef idx="3">
+            <a:schemeClr val="accent1"/>
+          </a:fillRef>
+          <a:effectRef idx="2">
+            <a:schemeClr val="accent1"/>
+          </a:effectRef>
+          <a:fontRef idx="minor">
+            <a:schemeClr val="lt1"/>
+          </a:fontRef>
+        </p:style>
+      </p:sp>
+      <p:sp>
+        <p:nvSpPr>
+          <p:cNvPr id="2076" name="Rectangle 2075">
+            <a:extLst>
+              <a:ext uri="{FF2B5EF4-FFF2-40B4-BE49-F238E27FC236}">
+                <a16:creationId xmlns:a16="http://schemas.microsoft.com/office/drawing/2014/main" id="{ECA7E90F-7383-4A8D-B3B2-977D30D27076}"/>
+              </a:ext>
+              <a:ext uri="{C183D7F6-B498-43B3-948B-1728B52AA6E4}">
+                <adec:decorative xmlns:adec="http://schemas.microsoft.com/office/drawing/2017/decorative" val="1"/>
+              </a:ext>
+            </a:extLst>
+          </p:cNvPr>
+          <p:cNvSpPr>
+            <a:spLocks noGrp="1" noRot="1" noChangeAspect="1" noMove="1" noResize="1" noEditPoints="1" noAdjustHandles="1" noChangeArrowheads="1" noChangeShapeType="1" noTextEdit="1"/>
+          </p:cNvSpPr>
+          <p:nvPr>
+            <p:extLst>
+              <p:ext uri="{386F3935-93C4-4BCD-93E2-E3B085C9AB24}">
+                <p16:designElem xmlns:p16="http://schemas.microsoft.com/office/powerpoint/2015/main" val="1"/>
+              </p:ext>
+            </p:extLst>
+          </p:nvPr>
+        </p:nvSpPr>
+        <p:spPr>
+          <a:xfrm>
+            <a:off x="7734797" y="1661699"/>
+            <a:ext cx="3703320" cy="94997"/>
+          </a:xfrm>
+          <a:prstGeom prst="rect">
+            <a:avLst/>
+          </a:prstGeom>
+          <a:solidFill>
+            <a:srgbClr val="FFB53F">
+              <a:alpha val="40000"/>
+            </a:srgbClr>
+          </a:solidFill>
+          <a:ln>
+            <a:noFill/>
+          </a:ln>
+          <a:effectLst/>
+        </p:spPr>
+        <p:style>
+          <a:lnRef idx="1">
+            <a:schemeClr val="accent1"/>
+          </a:lnRef>
+          <a:fillRef idx="3">
+            <a:schemeClr val="accent1"/>
+          </a:fillRef>
+          <a:effectRef idx="2">
+            <a:schemeClr val="accent1"/>
+          </a:effectRef>
+          <a:fontRef idx="minor">
+            <a:schemeClr val="lt1"/>
+          </a:fontRef>
+        </p:style>
+      </p:sp>
+      <p:sp>
+        <p:nvSpPr>
+          <p:cNvPr id="2078" name="Rectangle 2077">
+            <a:extLst>
+              <a:ext uri="{FF2B5EF4-FFF2-40B4-BE49-F238E27FC236}">
+                <a16:creationId xmlns:a16="http://schemas.microsoft.com/office/drawing/2014/main" id="{1F1FF39A-AC3C-4066-9D4C-519AA22812EA}"/>
+              </a:ext>
+              <a:ext uri="{C183D7F6-B498-43B3-948B-1728B52AA6E4}">
+                <adec:decorative xmlns:adec="http://schemas.microsoft.com/office/drawing/2017/decorative" val="1"/>
+              </a:ext>
+            </a:extLst>
+          </p:cNvPr>
+          <p:cNvSpPr>
+            <a:spLocks noGrp="1" noRot="1" noChangeAspect="1" noMove="1" noResize="1" noEditPoints="1" noAdjustHandles="1" noChangeArrowheads="1" noChangeShapeType="1" noTextEdit="1"/>
+          </p:cNvSpPr>
+          <p:nvPr>
+            <p:extLst>
+              <p:ext uri="{386F3935-93C4-4BCD-93E2-E3B085C9AB24}">
+                <p16:designElem xmlns:p16="http://schemas.microsoft.com/office/powerpoint/2015/main" val="1"/>
+              </p:ext>
+            </p:extLst>
+          </p:nvPr>
+        </p:nvSpPr>
+        <p:spPr>
+          <a:xfrm>
+            <a:off x="7735983" y="1812471"/>
+            <a:ext cx="3702134" cy="3383831"/>
+          </a:xfrm>
+          <a:prstGeom prst="rect">
+            <a:avLst/>
+          </a:prstGeom>
+          <a:solidFill>
+            <a:schemeClr val="tx1">
+              <a:alpha val="50000"/>
+            </a:schemeClr>
+          </a:solidFill>
+          <a:ln w="6350" cmpd="sng">
+            <a:noFill/>
+          </a:ln>
+          <a:effectLst/>
+        </p:spPr>
+        <p:style>
+          <a:lnRef idx="1">
+            <a:schemeClr val="accent1"/>
+          </a:lnRef>
+          <a:fillRef idx="3">
+            <a:schemeClr val="accent1"/>
+          </a:fillRef>
+          <a:effectRef idx="2">
+            <a:schemeClr val="accent1"/>
+          </a:effectRef>
+          <a:fontRef idx="minor">
+            <a:schemeClr val="lt1"/>
+          </a:fontRef>
+        </p:style>
+      </p:sp>
+      <p:sp>
+        <p:nvSpPr>
+          <p:cNvPr id="2080" name="Rectangle 2079">
+            <a:extLst>
+              <a:ext uri="{FF2B5EF4-FFF2-40B4-BE49-F238E27FC236}">
+                <a16:creationId xmlns:a16="http://schemas.microsoft.com/office/drawing/2014/main" id="{153E7C7A-D853-434A-AA24-D8C247D80CCB}"/>
+              </a:ext>
+              <a:ext uri="{C183D7F6-B498-43B3-948B-1728B52AA6E4}">
+                <adec:decorative xmlns:adec="http://schemas.microsoft.com/office/drawing/2017/decorative" val="1"/>
+              </a:ext>
+            </a:extLst>
+          </p:cNvPr>
+          <p:cNvSpPr>
+            <a:spLocks noGrp="1" noRot="1" noChangeAspect="1" noMove="1" noResize="1" noEditPoints="1" noAdjustHandles="1" noChangeArrowheads="1" noChangeShapeType="1" noTextEdit="1"/>
+          </p:cNvSpPr>
+          <p:nvPr>
+            <p:extLst>
+              <p:ext uri="{386F3935-93C4-4BCD-93E2-E3B085C9AB24}">
+                <p16:designElem xmlns:p16="http://schemas.microsoft.com/office/powerpoint/2015/main" val="1"/>
+              </p:ext>
+            </p:extLst>
+          </p:nvPr>
+        </p:nvSpPr>
+        <p:spPr>
+          <a:xfrm>
+            <a:off x="7735983" y="1812471"/>
+            <a:ext cx="3702134" cy="3383831"/>
+          </a:xfrm>
+          <a:prstGeom prst="rect">
+            <a:avLst/>
+          </a:prstGeom>
+          <a:solidFill>
+            <a:srgbClr val="FFB53F">
+              <a:alpha val="40000"/>
+            </a:srgbClr>
+          </a:solidFill>
+          <a:ln w="6350" cmpd="sng">
+            <a:noFill/>
+          </a:ln>
+          <a:effectLst/>
+        </p:spPr>
+        <p:style>
+          <a:lnRef idx="1">
+            <a:schemeClr val="accent1"/>
+          </a:lnRef>
+          <a:fillRef idx="3">
+            <a:schemeClr val="accent1"/>
+          </a:fillRef>
+          <a:effectRef idx="2">
+            <a:schemeClr val="accent1"/>
+          </a:effectRef>
+          <a:fontRef idx="minor">
+            <a:schemeClr val="lt1"/>
+          </a:fontRef>
+        </p:style>
+      </p:sp>
+      <p:sp>
+        <p:nvSpPr>
+          <p:cNvPr id="2" name="Titel 1">
+            <a:extLst>
+              <a:ext uri="{FF2B5EF4-FFF2-40B4-BE49-F238E27FC236}">
+                <a16:creationId xmlns:a16="http://schemas.microsoft.com/office/drawing/2014/main" id="{CCAF7E6B-A2A0-8F8A-2CFB-3DDA51254A3E}"/>
+              </a:ext>
+            </a:extLst>
+          </p:cNvPr>
+          <p:cNvSpPr>
+            <a:spLocks noGrp="1"/>
+          </p:cNvSpPr>
+          <p:nvPr>
+            <p:ph type="title"/>
+          </p:nvPr>
+        </p:nvSpPr>
+        <p:spPr>
+          <a:xfrm>
+            <a:off x="7889065" y="2324906"/>
+            <a:ext cx="3403426" cy="1588698"/>
+          </a:xfrm>
+        </p:spPr>
+        <p:txBody>
+          <a:bodyPr vert="horz" lIns="91440" tIns="45720" rIns="91440" bIns="45720" rtlCol="0" anchor="b">
+            <a:normAutofit/>
+          </a:bodyPr>
+          <a:lstStyle/>
+          <a:p>
+            <a:r>
+              <a:rPr lang="en-US" sz="3600" dirty="0">
+                <a:solidFill>
+                  <a:schemeClr val="bg1"/>
+                </a:solidFill>
+              </a:rPr>
+              <a:t>Other Games</a:t>
+            </a:r>
+          </a:p>
+        </p:txBody>
+      </p:sp>
+    </p:spTree>
+    <p:extLst>
+      <p:ext uri="{BB962C8B-B14F-4D97-AF65-F5344CB8AC3E}">
+        <p14:creationId xmlns:p14="http://schemas.microsoft.com/office/powerpoint/2010/main" val="3066787884"/>
+      </p:ext>
+    </p:extLst>
+  </p:cSld>
+  <p:clrMapOvr>
+    <a:masterClrMapping/>
   </p:clrMapOvr>
 </p:sld>
 </file>
@@ -6136,6 +6144,1500 @@
           <a:noFill/>
           <a:ln>
             <a:solidFill>
+              <a:srgbClr val="FBB367"/>
+            </a:solidFill>
+          </a:ln>
+        </p:spPr>
+        <p:style>
+          <a:lnRef idx="2">
+            <a:schemeClr val="accent1">
+              <a:shade val="50000"/>
+            </a:schemeClr>
+          </a:lnRef>
+          <a:fillRef idx="1">
+            <a:schemeClr val="accent1"/>
+          </a:fillRef>
+          <a:effectRef idx="0">
+            <a:schemeClr val="accent1"/>
+          </a:effectRef>
+          <a:fontRef idx="minor">
+            <a:schemeClr val="lt1"/>
+          </a:fontRef>
+        </p:style>
+        <p:txBody>
+          <a:bodyPr rtlCol="0" anchor="ctr"/>
+          <a:lstStyle/>
+          <a:p>
+            <a:pPr algn="ctr"/>
+            <a:endParaRPr lang="en-US"/>
+          </a:p>
+        </p:txBody>
+      </p:sp>
+      <p:sp>
+        <p:nvSpPr>
+          <p:cNvPr id="20" name="Rectangle 19">
+            <a:extLst>
+              <a:ext uri="{FF2B5EF4-FFF2-40B4-BE49-F238E27FC236}">
+                <a16:creationId xmlns:a16="http://schemas.microsoft.com/office/drawing/2014/main" id="{A98F2782-0AD1-4AB6-BBB8-3BA1BB416CE2}"/>
+              </a:ext>
+              <a:ext uri="{C183D7F6-B498-43B3-948B-1728B52AA6E4}">
+                <adec:decorative xmlns:adec="http://schemas.microsoft.com/office/drawing/2017/decorative" val="1"/>
+              </a:ext>
+            </a:extLst>
+          </p:cNvPr>
+          <p:cNvSpPr>
+            <a:spLocks noGrp="1" noRot="1" noChangeAspect="1" noMove="1" noResize="1" noEditPoints="1" noAdjustHandles="1" noChangeArrowheads="1" noChangeShapeType="1" noTextEdit="1"/>
+          </p:cNvSpPr>
+          <p:nvPr>
+            <p:extLst>
+              <p:ext uri="{386F3935-93C4-4BCD-93E2-E3B085C9AB24}">
+                <p16:designElem xmlns:p16="http://schemas.microsoft.com/office/powerpoint/2015/main" val="1"/>
+              </p:ext>
+            </p:extLst>
+          </p:nvPr>
+        </p:nvSpPr>
+        <p:spPr>
+          <a:xfrm>
+            <a:off x="643466" y="643468"/>
+            <a:ext cx="10905067" cy="5571066"/>
+          </a:xfrm>
+          <a:prstGeom prst="rect">
+            <a:avLst/>
+          </a:prstGeom>
+          <a:solidFill>
+            <a:srgbClr val="FFFFFF"/>
+          </a:solidFill>
+          <a:ln>
+            <a:noFill/>
+          </a:ln>
+        </p:spPr>
+        <p:style>
+          <a:lnRef idx="2">
+            <a:schemeClr val="accent1">
+              <a:shade val="50000"/>
+            </a:schemeClr>
+          </a:lnRef>
+          <a:fillRef idx="1">
+            <a:schemeClr val="accent1"/>
+          </a:fillRef>
+          <a:effectRef idx="0">
+            <a:schemeClr val="accent1"/>
+          </a:effectRef>
+          <a:fontRef idx="minor">
+            <a:schemeClr val="lt1"/>
+          </a:fontRef>
+        </p:style>
+        <p:txBody>
+          <a:bodyPr rtlCol="0" anchor="ctr"/>
+          <a:lstStyle/>
+          <a:p>
+            <a:pPr algn="ctr"/>
+            <a:endParaRPr lang="en-US"/>
+          </a:p>
+        </p:txBody>
+      </p:sp>
+      <p:pic>
+        <p:nvPicPr>
+          <p:cNvPr id="5" name="Inhaltsplatzhalter 4">
+            <a:extLst>
+              <a:ext uri="{FF2B5EF4-FFF2-40B4-BE49-F238E27FC236}">
+                <a16:creationId xmlns:a16="http://schemas.microsoft.com/office/drawing/2014/main" id="{B8833675-B015-5F41-47F0-C3FF41D5045B}"/>
+              </a:ext>
+            </a:extLst>
+          </p:cNvPr>
+          <p:cNvPicPr>
+            <a:picLocks noGrp="1" noChangeAspect="1"/>
+          </p:cNvPicPr>
+          <p:nvPr>
+            <p:ph idx="1"/>
+          </p:nvPr>
+        </p:nvPicPr>
+        <p:blipFill>
+          <a:blip r:embed="rId2"/>
+          <a:stretch>
+            <a:fillRect/>
+          </a:stretch>
+        </p:blipFill>
+        <p:spPr>
+          <a:xfrm>
+            <a:off x="1120477" y="1584984"/>
+            <a:ext cx="9951041" cy="3681886"/>
+          </a:xfrm>
+          <a:prstGeom prst="rect">
+            <a:avLst/>
+          </a:prstGeom>
+        </p:spPr>
+      </p:pic>
+    </p:spTree>
+    <p:extLst>
+      <p:ext uri="{BB962C8B-B14F-4D97-AF65-F5344CB8AC3E}">
+        <p14:creationId xmlns:p14="http://schemas.microsoft.com/office/powerpoint/2010/main" val="3004782944"/>
+      </p:ext>
+    </p:extLst>
+  </p:cSld>
+  <p:clrMapOvr>
+    <a:overrideClrMapping bg1="dk1" tx1="lt1" bg2="dk2" tx2="lt2" accent1="accent1" accent2="accent2" accent3="accent3" accent4="accent4" accent5="accent5" accent6="accent6" hlink="hlink" folHlink="folHlink"/>
+  </p:clrMapOvr>
+</p:sld>
+</file>
+
+<file path=ppt/slides/slide14.xml><?xml version="1.0" encoding="utf-8"?>
+<p:sld xmlns:a="http://schemas.openxmlformats.org/drawingml/2006/main" xmlns:r="http://schemas.openxmlformats.org/officeDocument/2006/relationships" xmlns:p="http://schemas.openxmlformats.org/presentationml/2006/main">
+  <p:cSld>
+    <p:bg>
+      <p:bgPr>
+        <a:solidFill>
+          <a:schemeClr val="bg1"/>
+        </a:solidFill>
+        <a:effectLst/>
+      </p:bgPr>
+    </p:bg>
+    <p:spTree>
+      <p:nvGrpSpPr>
+        <p:cNvPr id="1" name=""/>
+        <p:cNvGrpSpPr/>
+        <p:nvPr/>
+      </p:nvGrpSpPr>
+      <p:grpSpPr>
+        <a:xfrm>
+          <a:off x="0" y="0"/>
+          <a:ext cx="0" cy="0"/>
+          <a:chOff x="0" y="0"/>
+          <a:chExt cx="0" cy="0"/>
+        </a:xfrm>
+      </p:grpSpPr>
+      <p:sp>
+        <p:nvSpPr>
+          <p:cNvPr id="2077" name="Rectangle 2063">
+            <a:extLst>
+              <a:ext uri="{FF2B5EF4-FFF2-40B4-BE49-F238E27FC236}">
+                <a16:creationId xmlns:a16="http://schemas.microsoft.com/office/drawing/2014/main" id="{E6C8E6EB-4C59-429B-97E4-72A058CFC4FB}"/>
+              </a:ext>
+              <a:ext uri="{C183D7F6-B498-43B3-948B-1728B52AA6E4}">
+                <adec:decorative xmlns:adec="http://schemas.microsoft.com/office/drawing/2017/decorative" val="1"/>
+              </a:ext>
+            </a:extLst>
+          </p:cNvPr>
+          <p:cNvSpPr>
+            <a:spLocks noGrp="1" noRot="1" noChangeAspect="1" noMove="1" noResize="1" noEditPoints="1" noAdjustHandles="1" noChangeArrowheads="1" noChangeShapeType="1" noTextEdit="1"/>
+          </p:cNvSpPr>
+          <p:nvPr>
+            <p:extLst>
+              <p:ext uri="{386F3935-93C4-4BCD-93E2-E3B085C9AB24}">
+                <p16:designElem xmlns:p16="http://schemas.microsoft.com/office/powerpoint/2015/main" val="1"/>
+              </p:ext>
+            </p:extLst>
+          </p:nvPr>
+        </p:nvSpPr>
+        <p:spPr>
+          <a:xfrm>
+            <a:off x="446534" y="457200"/>
+            <a:ext cx="3703320" cy="94997"/>
+          </a:xfrm>
+          <a:prstGeom prst="rect">
+            <a:avLst/>
+          </a:prstGeom>
+          <a:solidFill>
+            <a:srgbClr val="465359"/>
+          </a:solidFill>
+          <a:ln>
+            <a:noFill/>
+          </a:ln>
+          <a:effectLst/>
+        </p:spPr>
+        <p:style>
+          <a:lnRef idx="1">
+            <a:schemeClr val="accent1"/>
+          </a:lnRef>
+          <a:fillRef idx="3">
+            <a:schemeClr val="accent1"/>
+          </a:fillRef>
+          <a:effectRef idx="2">
+            <a:schemeClr val="accent1"/>
+          </a:effectRef>
+          <a:fontRef idx="minor">
+            <a:schemeClr val="lt1"/>
+          </a:fontRef>
+        </p:style>
+      </p:sp>
+      <p:sp>
+        <p:nvSpPr>
+          <p:cNvPr id="2079" name="Rectangle 2065">
+            <a:extLst>
+              <a:ext uri="{FF2B5EF4-FFF2-40B4-BE49-F238E27FC236}">
+                <a16:creationId xmlns:a16="http://schemas.microsoft.com/office/drawing/2014/main" id="{B5B90362-AFCC-46A9-B41C-A257A8C5B314}"/>
+              </a:ext>
+              <a:ext uri="{C183D7F6-B498-43B3-948B-1728B52AA6E4}">
+                <adec:decorative xmlns:adec="http://schemas.microsoft.com/office/drawing/2017/decorative" val="1"/>
+              </a:ext>
+            </a:extLst>
+          </p:cNvPr>
+          <p:cNvSpPr>
+            <a:spLocks noGrp="1" noRot="1" noChangeAspect="1" noMove="1" noResize="1" noEditPoints="1" noAdjustHandles="1" noChangeArrowheads="1" noChangeShapeType="1" noTextEdit="1"/>
+          </p:cNvSpPr>
+          <p:nvPr>
+            <p:extLst>
+              <p:ext uri="{386F3935-93C4-4BCD-93E2-E3B085C9AB24}">
+                <p16:designElem xmlns:p16="http://schemas.microsoft.com/office/powerpoint/2015/main" val="1"/>
+              </p:ext>
+            </p:extLst>
+          </p:nvPr>
+        </p:nvSpPr>
+        <p:spPr>
+          <a:xfrm>
+            <a:off x="8042147" y="453643"/>
+            <a:ext cx="3703320" cy="98554"/>
+          </a:xfrm>
+          <a:prstGeom prst="rect">
+            <a:avLst/>
+          </a:prstGeom>
+          <a:solidFill>
+            <a:srgbClr val="969FA7"/>
+          </a:solidFill>
+          <a:ln>
+            <a:noFill/>
+          </a:ln>
+          <a:effectLst/>
+        </p:spPr>
+        <p:style>
+          <a:lnRef idx="1">
+            <a:schemeClr val="accent1"/>
+          </a:lnRef>
+          <a:fillRef idx="3">
+            <a:schemeClr val="accent1"/>
+          </a:fillRef>
+          <a:effectRef idx="2">
+            <a:schemeClr val="accent1"/>
+          </a:effectRef>
+          <a:fontRef idx="minor">
+            <a:schemeClr val="lt1"/>
+          </a:fontRef>
+        </p:style>
+      </p:sp>
+      <p:sp>
+        <p:nvSpPr>
+          <p:cNvPr id="2081" name="Rectangle 2067">
+            <a:extLst>
+              <a:ext uri="{FF2B5EF4-FFF2-40B4-BE49-F238E27FC236}">
+                <a16:creationId xmlns:a16="http://schemas.microsoft.com/office/drawing/2014/main" id="{F71EF7F1-38BA-471D-8CD4-2A9AE8E35527}"/>
+              </a:ext>
+              <a:ext uri="{C183D7F6-B498-43B3-948B-1728B52AA6E4}">
+                <adec:decorative xmlns:adec="http://schemas.microsoft.com/office/drawing/2017/decorative" val="1"/>
+              </a:ext>
+            </a:extLst>
+          </p:cNvPr>
+          <p:cNvSpPr>
+            <a:spLocks noGrp="1" noRot="1" noChangeAspect="1" noMove="1" noResize="1" noEditPoints="1" noAdjustHandles="1" noChangeArrowheads="1" noChangeShapeType="1" noTextEdit="1"/>
+          </p:cNvSpPr>
+          <p:nvPr>
+            <p:extLst>
+              <p:ext uri="{386F3935-93C4-4BCD-93E2-E3B085C9AB24}">
+                <p16:designElem xmlns:p16="http://schemas.microsoft.com/office/powerpoint/2015/main" val="1"/>
+              </p:ext>
+            </p:extLst>
+          </p:nvPr>
+        </p:nvSpPr>
+        <p:spPr>
+          <a:xfrm>
+            <a:off x="4241830" y="457200"/>
+            <a:ext cx="3703320" cy="91440"/>
+          </a:xfrm>
+          <a:prstGeom prst="rect">
+            <a:avLst/>
+          </a:prstGeom>
+          <a:solidFill>
+            <a:schemeClr val="accent1"/>
+          </a:solidFill>
+          <a:ln>
+            <a:noFill/>
+          </a:ln>
+          <a:effectLst/>
+        </p:spPr>
+        <p:style>
+          <a:lnRef idx="1">
+            <a:schemeClr val="accent1"/>
+          </a:lnRef>
+          <a:fillRef idx="3">
+            <a:schemeClr val="accent1"/>
+          </a:fillRef>
+          <a:effectRef idx="2">
+            <a:schemeClr val="accent1"/>
+          </a:effectRef>
+          <a:fontRef idx="minor">
+            <a:schemeClr val="lt1"/>
+          </a:fontRef>
+        </p:style>
+      </p:sp>
+      <p:sp>
+        <p:nvSpPr>
+          <p:cNvPr id="2082" name="Rectangle 2069">
+            <a:extLst>
+              <a:ext uri="{FF2B5EF4-FFF2-40B4-BE49-F238E27FC236}">
+                <a16:creationId xmlns:a16="http://schemas.microsoft.com/office/drawing/2014/main" id="{C0524398-BFB4-4C4A-8317-83B8729F9B26}"/>
+              </a:ext>
+              <a:ext uri="{C183D7F6-B498-43B3-948B-1728B52AA6E4}">
+                <adec:decorative xmlns:adec="http://schemas.microsoft.com/office/drawing/2017/decorative" val="1"/>
+              </a:ext>
+            </a:extLst>
+          </p:cNvPr>
+          <p:cNvSpPr>
+            <a:spLocks noGrp="1" noRot="1" noChangeAspect="1" noMove="1" noResize="1" noEditPoints="1" noAdjustHandles="1" noChangeArrowheads="1" noChangeShapeType="1" noTextEdit="1"/>
+          </p:cNvSpPr>
+          <p:nvPr>
+            <p:extLst>
+              <p:ext uri="{386F3935-93C4-4BCD-93E2-E3B085C9AB24}">
+                <p16:designElem xmlns:p16="http://schemas.microsoft.com/office/powerpoint/2015/main" val="1"/>
+              </p:ext>
+            </p:extLst>
+          </p:nvPr>
+        </p:nvSpPr>
+        <p:spPr>
+          <a:xfrm>
+            <a:off x="446534" y="3085764"/>
+            <a:ext cx="11298932" cy="3338149"/>
+          </a:xfrm>
+          <a:prstGeom prst="rect">
+            <a:avLst/>
+          </a:prstGeom>
+          <a:solidFill>
+            <a:srgbClr val="465359"/>
+          </a:solidFill>
+          <a:ln>
+            <a:noFill/>
+          </a:ln>
+          <a:effectLst/>
+        </p:spPr>
+        <p:style>
+          <a:lnRef idx="1">
+            <a:schemeClr val="accent1"/>
+          </a:lnRef>
+          <a:fillRef idx="3">
+            <a:schemeClr val="accent1"/>
+          </a:fillRef>
+          <a:effectRef idx="2">
+            <a:schemeClr val="accent1"/>
+          </a:effectRef>
+          <a:fontRef idx="minor">
+            <a:schemeClr val="lt1"/>
+          </a:fontRef>
+        </p:style>
+      </p:sp>
+      <p:sp useBgFill="1">
+        <p:nvSpPr>
+          <p:cNvPr id="2083" name="Rectangle 2071">
+            <a:extLst>
+              <a:ext uri="{FF2B5EF4-FFF2-40B4-BE49-F238E27FC236}">
+                <a16:creationId xmlns:a16="http://schemas.microsoft.com/office/drawing/2014/main" id="{26B4480E-B7FF-4481-890E-043A69AE6FE2}"/>
+              </a:ext>
+              <a:ext uri="{C183D7F6-B498-43B3-948B-1728B52AA6E4}">
+                <adec:decorative xmlns:adec="http://schemas.microsoft.com/office/drawing/2017/decorative" val="1"/>
+              </a:ext>
+            </a:extLst>
+          </p:cNvPr>
+          <p:cNvSpPr>
+            <a:spLocks noGrp="1" noRot="1" noChangeAspect="1" noMove="1" noResize="1" noEditPoints="1" noAdjustHandles="1" noChangeArrowheads="1" noChangeShapeType="1" noTextEdit="1"/>
+          </p:cNvSpPr>
+          <p:nvPr>
+            <p:extLst>
+              <p:ext uri="{386F3935-93C4-4BCD-93E2-E3B085C9AB24}">
+                <p16:designElem xmlns:p16="http://schemas.microsoft.com/office/powerpoint/2015/main" val="1"/>
+              </p:ext>
+            </p:extLst>
+          </p:nvPr>
+        </p:nvSpPr>
+        <p:spPr>
+          <a:xfrm>
+            <a:off x="0" y="0"/>
+            <a:ext cx="12192000" cy="6858000"/>
+          </a:xfrm>
+          <a:prstGeom prst="rect">
+            <a:avLst/>
+          </a:prstGeom>
+          <a:ln>
+            <a:noFill/>
+          </a:ln>
+        </p:spPr>
+        <p:style>
+          <a:lnRef idx="2">
+            <a:schemeClr val="accent1">
+              <a:shade val="50000"/>
+            </a:schemeClr>
+          </a:lnRef>
+          <a:fillRef idx="1">
+            <a:schemeClr val="accent1"/>
+          </a:fillRef>
+          <a:effectRef idx="0">
+            <a:schemeClr val="accent1"/>
+          </a:effectRef>
+          <a:fontRef idx="minor">
+            <a:schemeClr val="lt1"/>
+          </a:fontRef>
+        </p:style>
+        <p:txBody>
+          <a:bodyPr rtlCol="0" anchor="ctr"/>
+          <a:lstStyle/>
+          <a:p>
+            <a:pPr algn="ctr"/>
+            <a:endParaRPr lang="en-US"/>
+          </a:p>
+        </p:txBody>
+      </p:sp>
+      <p:pic>
+        <p:nvPicPr>
+          <p:cNvPr id="2050" name="Picture 2" descr="League of Legends (LoL) - wymagania na PC | Eurogamer.pl">
+            <a:extLst>
+              <a:ext uri="{FF2B5EF4-FFF2-40B4-BE49-F238E27FC236}">
+                <a16:creationId xmlns:a16="http://schemas.microsoft.com/office/drawing/2014/main" id="{DD20B372-8E75-B6FE-3B3A-7D6CF61B1540}"/>
+              </a:ext>
+            </a:extLst>
+          </p:cNvPr>
+          <p:cNvPicPr>
+            <a:picLocks noGrp="1" noChangeAspect="1" noChangeArrowheads="1"/>
+          </p:cNvPicPr>
+          <p:nvPr>
+            <p:ph idx="1"/>
+          </p:nvPr>
+        </p:nvPicPr>
+        <p:blipFill rotWithShape="1">
+          <a:blip r:embed="rId2">
+            <a:extLst>
+              <a:ext uri="{28A0092B-C50C-407E-A947-70E740481C1C}">
+                <a14:useLocalDpi xmlns:a14="http://schemas.microsoft.com/office/drawing/2010/main" val="0"/>
+              </a:ext>
+            </a:extLst>
+          </a:blip>
+          <a:srcRect/>
+          <a:stretch/>
+        </p:blipFill>
+        <p:spPr bwMode="auto">
+          <a:xfrm>
+            <a:off x="0" y="0"/>
+            <a:ext cx="12192000" cy="6858000"/>
+          </a:xfrm>
+          <a:prstGeom prst="rect">
+            <a:avLst/>
+          </a:prstGeom>
+          <a:noFill/>
+          <a:extLst>
+            <a:ext uri="{909E8E84-426E-40DD-AFC4-6F175D3DCCD1}">
+              <a14:hiddenFill xmlns:a14="http://schemas.microsoft.com/office/drawing/2010/main">
+                <a:solidFill>
+                  <a:srgbClr val="FFFFFF"/>
+                </a:solidFill>
+              </a14:hiddenFill>
+            </a:ext>
+          </a:extLst>
+        </p:spPr>
+      </p:pic>
+      <p:sp>
+        <p:nvSpPr>
+          <p:cNvPr id="2084" name="Rectangle 2073">
+            <a:extLst>
+              <a:ext uri="{FF2B5EF4-FFF2-40B4-BE49-F238E27FC236}">
+                <a16:creationId xmlns:a16="http://schemas.microsoft.com/office/drawing/2014/main" id="{64C13BAB-7C00-4D21-A857-E3D41C0A2A66}"/>
+              </a:ext>
+              <a:ext uri="{C183D7F6-B498-43B3-948B-1728B52AA6E4}">
+                <adec:decorative xmlns:adec="http://schemas.microsoft.com/office/drawing/2017/decorative" val="1"/>
+              </a:ext>
+            </a:extLst>
+          </p:cNvPr>
+          <p:cNvSpPr>
+            <a:spLocks noGrp="1" noRot="1" noChangeAspect="1" noMove="1" noResize="1" noEditPoints="1" noAdjustHandles="1" noChangeArrowheads="1" noChangeShapeType="1" noTextEdit="1"/>
+          </p:cNvSpPr>
+          <p:nvPr>
+            <p:extLst>
+              <p:ext uri="{386F3935-93C4-4BCD-93E2-E3B085C9AB24}">
+                <p16:designElem xmlns:p16="http://schemas.microsoft.com/office/powerpoint/2015/main" val="1"/>
+              </p:ext>
+            </p:extLst>
+          </p:nvPr>
+        </p:nvSpPr>
+        <p:spPr>
+          <a:xfrm>
+            <a:off x="7734797" y="1661699"/>
+            <a:ext cx="3703320" cy="94997"/>
+          </a:xfrm>
+          <a:prstGeom prst="rect">
+            <a:avLst/>
+          </a:prstGeom>
+          <a:solidFill>
+            <a:schemeClr val="tx1">
+              <a:alpha val="50000"/>
+            </a:schemeClr>
+          </a:solidFill>
+          <a:ln>
+            <a:noFill/>
+          </a:ln>
+          <a:effectLst/>
+        </p:spPr>
+        <p:style>
+          <a:lnRef idx="1">
+            <a:schemeClr val="accent1"/>
+          </a:lnRef>
+          <a:fillRef idx="3">
+            <a:schemeClr val="accent1"/>
+          </a:fillRef>
+          <a:effectRef idx="2">
+            <a:schemeClr val="accent1"/>
+          </a:effectRef>
+          <a:fontRef idx="minor">
+            <a:schemeClr val="lt1"/>
+          </a:fontRef>
+        </p:style>
+      </p:sp>
+      <p:sp>
+        <p:nvSpPr>
+          <p:cNvPr id="2076" name="Rectangle 2075">
+            <a:extLst>
+              <a:ext uri="{FF2B5EF4-FFF2-40B4-BE49-F238E27FC236}">
+                <a16:creationId xmlns:a16="http://schemas.microsoft.com/office/drawing/2014/main" id="{ECA7E90F-7383-4A8D-B3B2-977D30D27076}"/>
+              </a:ext>
+              <a:ext uri="{C183D7F6-B498-43B3-948B-1728B52AA6E4}">
+                <adec:decorative xmlns:adec="http://schemas.microsoft.com/office/drawing/2017/decorative" val="1"/>
+              </a:ext>
+            </a:extLst>
+          </p:cNvPr>
+          <p:cNvSpPr>
+            <a:spLocks noGrp="1" noRot="1" noChangeAspect="1" noMove="1" noResize="1" noEditPoints="1" noAdjustHandles="1" noChangeArrowheads="1" noChangeShapeType="1" noTextEdit="1"/>
+          </p:cNvSpPr>
+          <p:nvPr>
+            <p:extLst>
+              <p:ext uri="{386F3935-93C4-4BCD-93E2-E3B085C9AB24}">
+                <p16:designElem xmlns:p16="http://schemas.microsoft.com/office/powerpoint/2015/main" val="1"/>
+              </p:ext>
+            </p:extLst>
+          </p:nvPr>
+        </p:nvSpPr>
+        <p:spPr>
+          <a:xfrm>
+            <a:off x="7734797" y="1661699"/>
+            <a:ext cx="3703320" cy="94997"/>
+          </a:xfrm>
+          <a:prstGeom prst="rect">
+            <a:avLst/>
+          </a:prstGeom>
+          <a:solidFill>
+            <a:srgbClr val="FFB53F">
+              <a:alpha val="40000"/>
+            </a:srgbClr>
+          </a:solidFill>
+          <a:ln>
+            <a:noFill/>
+          </a:ln>
+          <a:effectLst/>
+        </p:spPr>
+        <p:style>
+          <a:lnRef idx="1">
+            <a:schemeClr val="accent1"/>
+          </a:lnRef>
+          <a:fillRef idx="3">
+            <a:schemeClr val="accent1"/>
+          </a:fillRef>
+          <a:effectRef idx="2">
+            <a:schemeClr val="accent1"/>
+          </a:effectRef>
+          <a:fontRef idx="minor">
+            <a:schemeClr val="lt1"/>
+          </a:fontRef>
+        </p:style>
+      </p:sp>
+      <p:sp>
+        <p:nvSpPr>
+          <p:cNvPr id="2078" name="Rectangle 2077">
+            <a:extLst>
+              <a:ext uri="{FF2B5EF4-FFF2-40B4-BE49-F238E27FC236}">
+                <a16:creationId xmlns:a16="http://schemas.microsoft.com/office/drawing/2014/main" id="{1F1FF39A-AC3C-4066-9D4C-519AA22812EA}"/>
+              </a:ext>
+              <a:ext uri="{C183D7F6-B498-43B3-948B-1728B52AA6E4}">
+                <adec:decorative xmlns:adec="http://schemas.microsoft.com/office/drawing/2017/decorative" val="1"/>
+              </a:ext>
+            </a:extLst>
+          </p:cNvPr>
+          <p:cNvSpPr>
+            <a:spLocks noGrp="1" noRot="1" noChangeAspect="1" noMove="1" noResize="1" noEditPoints="1" noAdjustHandles="1" noChangeArrowheads="1" noChangeShapeType="1" noTextEdit="1"/>
+          </p:cNvSpPr>
+          <p:nvPr>
+            <p:extLst>
+              <p:ext uri="{386F3935-93C4-4BCD-93E2-E3B085C9AB24}">
+                <p16:designElem xmlns:p16="http://schemas.microsoft.com/office/powerpoint/2015/main" val="1"/>
+              </p:ext>
+            </p:extLst>
+          </p:nvPr>
+        </p:nvSpPr>
+        <p:spPr>
+          <a:xfrm>
+            <a:off x="7735983" y="1812471"/>
+            <a:ext cx="3702134" cy="3383831"/>
+          </a:xfrm>
+          <a:prstGeom prst="rect">
+            <a:avLst/>
+          </a:prstGeom>
+          <a:solidFill>
+            <a:schemeClr val="tx1">
+              <a:alpha val="50000"/>
+            </a:schemeClr>
+          </a:solidFill>
+          <a:ln w="6350" cmpd="sng">
+            <a:noFill/>
+          </a:ln>
+          <a:effectLst/>
+        </p:spPr>
+        <p:style>
+          <a:lnRef idx="1">
+            <a:schemeClr val="accent1"/>
+          </a:lnRef>
+          <a:fillRef idx="3">
+            <a:schemeClr val="accent1"/>
+          </a:fillRef>
+          <a:effectRef idx="2">
+            <a:schemeClr val="accent1"/>
+          </a:effectRef>
+          <a:fontRef idx="minor">
+            <a:schemeClr val="lt1"/>
+          </a:fontRef>
+        </p:style>
+      </p:sp>
+      <p:sp>
+        <p:nvSpPr>
+          <p:cNvPr id="2080" name="Rectangle 2079">
+            <a:extLst>
+              <a:ext uri="{FF2B5EF4-FFF2-40B4-BE49-F238E27FC236}">
+                <a16:creationId xmlns:a16="http://schemas.microsoft.com/office/drawing/2014/main" id="{153E7C7A-D853-434A-AA24-D8C247D80CCB}"/>
+              </a:ext>
+              <a:ext uri="{C183D7F6-B498-43B3-948B-1728B52AA6E4}">
+                <adec:decorative xmlns:adec="http://schemas.microsoft.com/office/drawing/2017/decorative" val="1"/>
+              </a:ext>
+            </a:extLst>
+          </p:cNvPr>
+          <p:cNvSpPr>
+            <a:spLocks noGrp="1" noRot="1" noChangeAspect="1" noMove="1" noResize="1" noEditPoints="1" noAdjustHandles="1" noChangeArrowheads="1" noChangeShapeType="1" noTextEdit="1"/>
+          </p:cNvSpPr>
+          <p:nvPr>
+            <p:extLst>
+              <p:ext uri="{386F3935-93C4-4BCD-93E2-E3B085C9AB24}">
+                <p16:designElem xmlns:p16="http://schemas.microsoft.com/office/powerpoint/2015/main" val="1"/>
+              </p:ext>
+            </p:extLst>
+          </p:nvPr>
+        </p:nvSpPr>
+        <p:spPr>
+          <a:xfrm>
+            <a:off x="7735983" y="1812471"/>
+            <a:ext cx="3702134" cy="3383831"/>
+          </a:xfrm>
+          <a:prstGeom prst="rect">
+            <a:avLst/>
+          </a:prstGeom>
+          <a:solidFill>
+            <a:srgbClr val="FFB53F">
+              <a:alpha val="40000"/>
+            </a:srgbClr>
+          </a:solidFill>
+          <a:ln w="6350" cmpd="sng">
+            <a:noFill/>
+          </a:ln>
+          <a:effectLst/>
+        </p:spPr>
+        <p:style>
+          <a:lnRef idx="1">
+            <a:schemeClr val="accent1"/>
+          </a:lnRef>
+          <a:fillRef idx="3">
+            <a:schemeClr val="accent1"/>
+          </a:fillRef>
+          <a:effectRef idx="2">
+            <a:schemeClr val="accent1"/>
+          </a:effectRef>
+          <a:fontRef idx="minor">
+            <a:schemeClr val="lt1"/>
+          </a:fontRef>
+        </p:style>
+      </p:sp>
+      <p:sp>
+        <p:nvSpPr>
+          <p:cNvPr id="2" name="Titel 1">
+            <a:extLst>
+              <a:ext uri="{FF2B5EF4-FFF2-40B4-BE49-F238E27FC236}">
+                <a16:creationId xmlns:a16="http://schemas.microsoft.com/office/drawing/2014/main" id="{CCAF7E6B-A2A0-8F8A-2CFB-3DDA51254A3E}"/>
+              </a:ext>
+            </a:extLst>
+          </p:cNvPr>
+          <p:cNvSpPr>
+            <a:spLocks noGrp="1"/>
+          </p:cNvSpPr>
+          <p:nvPr>
+            <p:ph type="title"/>
+          </p:nvPr>
+        </p:nvSpPr>
+        <p:spPr>
+          <a:xfrm>
+            <a:off x="7889065" y="2324906"/>
+            <a:ext cx="3403426" cy="1588698"/>
+          </a:xfrm>
+        </p:spPr>
+        <p:txBody>
+          <a:bodyPr vert="horz" lIns="91440" tIns="45720" rIns="91440" bIns="45720" rtlCol="0" anchor="b">
+            <a:normAutofit/>
+          </a:bodyPr>
+          <a:lstStyle/>
+          <a:p>
+            <a:r>
+              <a:rPr lang="en-US" sz="3600" dirty="0">
+                <a:solidFill>
+                  <a:schemeClr val="bg1"/>
+                </a:solidFill>
+              </a:rPr>
+              <a:t>League of Legends</a:t>
+            </a:r>
+          </a:p>
+        </p:txBody>
+      </p:sp>
+    </p:spTree>
+    <p:extLst>
+      <p:ext uri="{BB962C8B-B14F-4D97-AF65-F5344CB8AC3E}">
+        <p14:creationId xmlns:p14="http://schemas.microsoft.com/office/powerpoint/2010/main" val="746657196"/>
+      </p:ext>
+    </p:extLst>
+  </p:cSld>
+  <p:clrMapOvr>
+    <a:masterClrMapping/>
+  </p:clrMapOvr>
+</p:sld>
+</file>
+
+<file path=ppt/slides/slide15.xml><?xml version="1.0" encoding="utf-8"?>
+<p:sld xmlns:a="http://schemas.openxmlformats.org/drawingml/2006/main" xmlns:r="http://schemas.openxmlformats.org/officeDocument/2006/relationships" xmlns:p="http://schemas.openxmlformats.org/presentationml/2006/main">
+  <p:cSld>
+    <p:bg>
+      <p:bgPr>
+        <a:gradFill rotWithShape="1">
+          <a:gsLst>
+            <a:gs pos="0">
+              <a:schemeClr val="bg1">
+                <a:tint val="90000"/>
+                <a:lumMod val="110000"/>
+              </a:schemeClr>
+            </a:gs>
+            <a:gs pos="100000">
+              <a:schemeClr val="bg1">
+                <a:shade val="98000"/>
+                <a:satMod val="110000"/>
+                <a:lumMod val="86000"/>
+              </a:schemeClr>
+            </a:gs>
+          </a:gsLst>
+          <a:path path="circle">
+            <a:fillToRect l="50000" t="50000" r="100000" b="100000"/>
+          </a:path>
+        </a:gradFill>
+        <a:effectLst/>
+      </p:bgPr>
+    </p:bg>
+    <p:spTree>
+      <p:nvGrpSpPr>
+        <p:cNvPr id="1" name=""/>
+        <p:cNvGrpSpPr/>
+        <p:nvPr/>
+      </p:nvGrpSpPr>
+      <p:grpSpPr>
+        <a:xfrm>
+          <a:off x="0" y="0"/>
+          <a:ext cx="0" cy="0"/>
+          <a:chOff x="0" y="0"/>
+          <a:chExt cx="0" cy="0"/>
+        </a:xfrm>
+      </p:grpSpPr>
+      <p:sp>
+        <p:nvSpPr>
+          <p:cNvPr id="25" name="Rectangle 24">
+            <a:extLst>
+              <a:ext uri="{FF2B5EF4-FFF2-40B4-BE49-F238E27FC236}">
+                <a16:creationId xmlns:a16="http://schemas.microsoft.com/office/drawing/2014/main" id="{1DDC3EF6-2EA5-44B3-94C7-9DDA67A127D0}"/>
+              </a:ext>
+              <a:ext uri="{C183D7F6-B498-43B3-948B-1728B52AA6E4}">
+                <adec:decorative xmlns:adec="http://schemas.microsoft.com/office/drawing/2017/decorative" val="1"/>
+              </a:ext>
+            </a:extLst>
+          </p:cNvPr>
+          <p:cNvSpPr>
+            <a:spLocks noGrp="1" noRot="1" noChangeAspect="1" noMove="1" noResize="1" noEditPoints="1" noAdjustHandles="1" noChangeArrowheads="1" noChangeShapeType="1" noTextEdit="1"/>
+          </p:cNvSpPr>
+          <p:nvPr>
+            <p:extLst>
+              <p:ext uri="{386F3935-93C4-4BCD-93E2-E3B085C9AB24}">
+                <p16:designElem xmlns:p16="http://schemas.microsoft.com/office/powerpoint/2015/main" val="1"/>
+              </p:ext>
+            </p:extLst>
+          </p:nvPr>
+        </p:nvSpPr>
+        <p:spPr>
+          <a:xfrm>
+            <a:off x="446534" y="457200"/>
+            <a:ext cx="3703320" cy="94997"/>
+          </a:xfrm>
+          <a:prstGeom prst="rect">
+            <a:avLst/>
+          </a:prstGeom>
+          <a:solidFill>
+            <a:srgbClr val="465359"/>
+          </a:solidFill>
+          <a:ln>
+            <a:noFill/>
+          </a:ln>
+          <a:effectLst/>
+        </p:spPr>
+        <p:style>
+          <a:lnRef idx="1">
+            <a:schemeClr val="accent1"/>
+          </a:lnRef>
+          <a:fillRef idx="3">
+            <a:schemeClr val="accent1"/>
+          </a:fillRef>
+          <a:effectRef idx="2">
+            <a:schemeClr val="accent1"/>
+          </a:effectRef>
+          <a:fontRef idx="minor">
+            <a:schemeClr val="lt1"/>
+          </a:fontRef>
+        </p:style>
+      </p:sp>
+      <p:sp>
+        <p:nvSpPr>
+          <p:cNvPr id="27" name="Rectangle 26">
+            <a:extLst>
+              <a:ext uri="{FF2B5EF4-FFF2-40B4-BE49-F238E27FC236}">
+                <a16:creationId xmlns:a16="http://schemas.microsoft.com/office/drawing/2014/main" id="{87925A9A-E9FA-496E-9C09-7C2845E0062B}"/>
+              </a:ext>
+              <a:ext uri="{C183D7F6-B498-43B3-948B-1728B52AA6E4}">
+                <adec:decorative xmlns:adec="http://schemas.microsoft.com/office/drawing/2017/decorative" val="1"/>
+              </a:ext>
+            </a:extLst>
+          </p:cNvPr>
+          <p:cNvSpPr>
+            <a:spLocks noGrp="1" noRot="1" noChangeAspect="1" noMove="1" noResize="1" noEditPoints="1" noAdjustHandles="1" noChangeArrowheads="1" noChangeShapeType="1" noTextEdit="1"/>
+          </p:cNvSpPr>
+          <p:nvPr>
+            <p:extLst>
+              <p:ext uri="{386F3935-93C4-4BCD-93E2-E3B085C9AB24}">
+                <p16:designElem xmlns:p16="http://schemas.microsoft.com/office/powerpoint/2015/main" val="1"/>
+              </p:ext>
+            </p:extLst>
+          </p:nvPr>
+        </p:nvSpPr>
+        <p:spPr>
+          <a:xfrm>
+            <a:off x="8042147" y="453643"/>
+            <a:ext cx="3703320" cy="98554"/>
+          </a:xfrm>
+          <a:prstGeom prst="rect">
+            <a:avLst/>
+          </a:prstGeom>
+          <a:solidFill>
+            <a:srgbClr val="969FA7"/>
+          </a:solidFill>
+          <a:ln>
+            <a:noFill/>
+          </a:ln>
+          <a:effectLst/>
+        </p:spPr>
+        <p:style>
+          <a:lnRef idx="1">
+            <a:schemeClr val="accent1"/>
+          </a:lnRef>
+          <a:fillRef idx="3">
+            <a:schemeClr val="accent1"/>
+          </a:fillRef>
+          <a:effectRef idx="2">
+            <a:schemeClr val="accent1"/>
+          </a:effectRef>
+          <a:fontRef idx="minor">
+            <a:schemeClr val="lt1"/>
+          </a:fontRef>
+        </p:style>
+      </p:sp>
+      <p:sp>
+        <p:nvSpPr>
+          <p:cNvPr id="29" name="Rectangle 28">
+            <a:extLst>
+              <a:ext uri="{FF2B5EF4-FFF2-40B4-BE49-F238E27FC236}">
+                <a16:creationId xmlns:a16="http://schemas.microsoft.com/office/drawing/2014/main" id="{2073ABB4-E164-4CBF-ADFF-25552BB7913B}"/>
+              </a:ext>
+              <a:ext uri="{C183D7F6-B498-43B3-948B-1728B52AA6E4}">
+                <adec:decorative xmlns:adec="http://schemas.microsoft.com/office/drawing/2017/decorative" val="1"/>
+              </a:ext>
+            </a:extLst>
+          </p:cNvPr>
+          <p:cNvSpPr>
+            <a:spLocks noGrp="1" noRot="1" noChangeAspect="1" noMove="1" noResize="1" noEditPoints="1" noAdjustHandles="1" noChangeArrowheads="1" noChangeShapeType="1" noTextEdit="1"/>
+          </p:cNvSpPr>
+          <p:nvPr>
+            <p:extLst>
+              <p:ext uri="{386F3935-93C4-4BCD-93E2-E3B085C9AB24}">
+                <p16:designElem xmlns:p16="http://schemas.microsoft.com/office/powerpoint/2015/main" val="1"/>
+              </p:ext>
+            </p:extLst>
+          </p:nvPr>
+        </p:nvSpPr>
+        <p:spPr>
+          <a:xfrm>
+            <a:off x="4241830" y="457200"/>
+            <a:ext cx="3703320" cy="91440"/>
+          </a:xfrm>
+          <a:prstGeom prst="rect">
+            <a:avLst/>
+          </a:prstGeom>
+          <a:solidFill>
+            <a:schemeClr val="accent1"/>
+          </a:solidFill>
+          <a:ln>
+            <a:noFill/>
+          </a:ln>
+          <a:effectLst/>
+        </p:spPr>
+        <p:style>
+          <a:lnRef idx="1">
+            <a:schemeClr val="accent1"/>
+          </a:lnRef>
+          <a:fillRef idx="3">
+            <a:schemeClr val="accent1"/>
+          </a:fillRef>
+          <a:effectRef idx="2">
+            <a:schemeClr val="accent1"/>
+          </a:effectRef>
+          <a:fontRef idx="minor">
+            <a:schemeClr val="lt1"/>
+          </a:fontRef>
+        </p:style>
+      </p:sp>
+      <p:sp useBgFill="1">
+        <p:nvSpPr>
+          <p:cNvPr id="31" name="Rectangle 30">
+            <a:extLst>
+              <a:ext uri="{FF2B5EF4-FFF2-40B4-BE49-F238E27FC236}">
+                <a16:creationId xmlns:a16="http://schemas.microsoft.com/office/drawing/2014/main" id="{20C97E5C-C165-417B-BBDE-6701E226BE3D}"/>
+              </a:ext>
+              <a:ext uri="{C183D7F6-B498-43B3-948B-1728B52AA6E4}">
+                <adec:decorative xmlns:adec="http://schemas.microsoft.com/office/drawing/2017/decorative" val="1"/>
+              </a:ext>
+            </a:extLst>
+          </p:cNvPr>
+          <p:cNvSpPr>
+            <a:spLocks noGrp="1" noRot="1" noChangeAspect="1" noMove="1" noResize="1" noEditPoints="1" noAdjustHandles="1" noChangeArrowheads="1" noChangeShapeType="1" noTextEdit="1"/>
+          </p:cNvSpPr>
+          <p:nvPr>
+            <p:extLst>
+              <p:ext uri="{386F3935-93C4-4BCD-93E2-E3B085C9AB24}">
+                <p16:designElem xmlns:p16="http://schemas.microsoft.com/office/powerpoint/2015/main" val="1"/>
+              </p:ext>
+            </p:extLst>
+          </p:nvPr>
+        </p:nvSpPr>
+        <p:spPr>
+          <a:xfrm>
+            <a:off x="0" y="0"/>
+            <a:ext cx="12192000" cy="6858000"/>
+          </a:xfrm>
+          <a:prstGeom prst="rect">
+            <a:avLst/>
+          </a:prstGeom>
+          <a:ln>
+            <a:noFill/>
+          </a:ln>
+        </p:spPr>
+        <p:style>
+          <a:lnRef idx="2">
+            <a:schemeClr val="accent1">
+              <a:shade val="50000"/>
+            </a:schemeClr>
+          </a:lnRef>
+          <a:fillRef idx="1">
+            <a:schemeClr val="accent1"/>
+          </a:fillRef>
+          <a:effectRef idx="0">
+            <a:schemeClr val="accent1"/>
+          </a:effectRef>
+          <a:fontRef idx="minor">
+            <a:schemeClr val="lt1"/>
+          </a:fontRef>
+        </p:style>
+        <p:txBody>
+          <a:bodyPr rtlCol="0" anchor="ctr"/>
+          <a:lstStyle/>
+          <a:p>
+            <a:pPr algn="ctr"/>
+            <a:endParaRPr lang="en-US"/>
+          </a:p>
+        </p:txBody>
+      </p:sp>
+      <p:sp>
+        <p:nvSpPr>
+          <p:cNvPr id="33" name="Rectangle 32">
+            <a:extLst>
+              <a:ext uri="{FF2B5EF4-FFF2-40B4-BE49-F238E27FC236}">
+                <a16:creationId xmlns:a16="http://schemas.microsoft.com/office/drawing/2014/main" id="{95D0E1C6-221C-4835-B0D4-24184F6B6E21}"/>
+              </a:ext>
+              <a:ext uri="{C183D7F6-B498-43B3-948B-1728B52AA6E4}">
+                <adec:decorative xmlns:adec="http://schemas.microsoft.com/office/drawing/2017/decorative" val="1"/>
+              </a:ext>
+            </a:extLst>
+          </p:cNvPr>
+          <p:cNvSpPr>
+            <a:spLocks noGrp="1" noRot="1" noChangeAspect="1" noMove="1" noResize="1" noEditPoints="1" noAdjustHandles="1" noChangeArrowheads="1" noChangeShapeType="1" noTextEdit="1"/>
+          </p:cNvSpPr>
+          <p:nvPr>
+            <p:extLst>
+              <p:ext uri="{386F3935-93C4-4BCD-93E2-E3B085C9AB24}">
+                <p16:designElem xmlns:p16="http://schemas.microsoft.com/office/powerpoint/2015/main" val="1"/>
+              </p:ext>
+            </p:extLst>
+          </p:nvPr>
+        </p:nvSpPr>
+        <p:spPr>
+          <a:xfrm>
+            <a:off x="477012" y="480060"/>
+            <a:ext cx="11237976" cy="5897880"/>
+          </a:xfrm>
+          <a:prstGeom prst="rect">
+            <a:avLst/>
+          </a:prstGeom>
+          <a:noFill/>
+          <a:ln>
+            <a:solidFill>
+              <a:srgbClr val="6F7DFA"/>
+            </a:solidFill>
+          </a:ln>
+        </p:spPr>
+        <p:style>
+          <a:lnRef idx="2">
+            <a:schemeClr val="accent1">
+              <a:shade val="50000"/>
+            </a:schemeClr>
+          </a:lnRef>
+          <a:fillRef idx="1">
+            <a:schemeClr val="accent1"/>
+          </a:fillRef>
+          <a:effectRef idx="0">
+            <a:schemeClr val="accent1"/>
+          </a:effectRef>
+          <a:fontRef idx="minor">
+            <a:schemeClr val="lt1"/>
+          </a:fontRef>
+        </p:style>
+        <p:txBody>
+          <a:bodyPr rtlCol="0" anchor="ctr"/>
+          <a:lstStyle/>
+          <a:p>
+            <a:pPr algn="ctr"/>
+            <a:endParaRPr lang="en-US"/>
+          </a:p>
+        </p:txBody>
+      </p:sp>
+      <p:sp>
+        <p:nvSpPr>
+          <p:cNvPr id="35" name="Rectangle 34">
+            <a:extLst>
+              <a:ext uri="{FF2B5EF4-FFF2-40B4-BE49-F238E27FC236}">
+                <a16:creationId xmlns:a16="http://schemas.microsoft.com/office/drawing/2014/main" id="{A98F2782-0AD1-4AB6-BBB8-3BA1BB416CE2}"/>
+              </a:ext>
+              <a:ext uri="{C183D7F6-B498-43B3-948B-1728B52AA6E4}">
+                <adec:decorative xmlns:adec="http://schemas.microsoft.com/office/drawing/2017/decorative" val="1"/>
+              </a:ext>
+            </a:extLst>
+          </p:cNvPr>
+          <p:cNvSpPr>
+            <a:spLocks noGrp="1" noRot="1" noChangeAspect="1" noMove="1" noResize="1" noEditPoints="1" noAdjustHandles="1" noChangeArrowheads="1" noChangeShapeType="1" noTextEdit="1"/>
+          </p:cNvSpPr>
+          <p:nvPr>
+            <p:extLst>
+              <p:ext uri="{386F3935-93C4-4BCD-93E2-E3B085C9AB24}">
+                <p16:designElem xmlns:p16="http://schemas.microsoft.com/office/powerpoint/2015/main" val="1"/>
+              </p:ext>
+            </p:extLst>
+          </p:nvPr>
+        </p:nvSpPr>
+        <p:spPr>
+          <a:xfrm>
+            <a:off x="643466" y="643468"/>
+            <a:ext cx="10905067" cy="5571066"/>
+          </a:xfrm>
+          <a:prstGeom prst="rect">
+            <a:avLst/>
+          </a:prstGeom>
+          <a:solidFill>
+            <a:srgbClr val="FFFFFF"/>
+          </a:solidFill>
+          <a:ln>
+            <a:noFill/>
+          </a:ln>
+        </p:spPr>
+        <p:style>
+          <a:lnRef idx="2">
+            <a:schemeClr val="accent1">
+              <a:shade val="50000"/>
+            </a:schemeClr>
+          </a:lnRef>
+          <a:fillRef idx="1">
+            <a:schemeClr val="accent1"/>
+          </a:fillRef>
+          <a:effectRef idx="0">
+            <a:schemeClr val="accent1"/>
+          </a:effectRef>
+          <a:fontRef idx="minor">
+            <a:schemeClr val="lt1"/>
+          </a:fontRef>
+        </p:style>
+        <p:txBody>
+          <a:bodyPr rtlCol="0" anchor="ctr"/>
+          <a:lstStyle/>
+          <a:p>
+            <a:pPr algn="ctr"/>
+            <a:endParaRPr lang="en-US"/>
+          </a:p>
+        </p:txBody>
+      </p:sp>
+      <p:pic>
+        <p:nvPicPr>
+          <p:cNvPr id="8" name="Inhaltsplatzhalter 7">
+            <a:extLst>
+              <a:ext uri="{FF2B5EF4-FFF2-40B4-BE49-F238E27FC236}">
+                <a16:creationId xmlns:a16="http://schemas.microsoft.com/office/drawing/2014/main" id="{F544CDCA-F8CE-F22F-C9F8-A286069D2B38}"/>
+              </a:ext>
+            </a:extLst>
+          </p:cNvPr>
+          <p:cNvPicPr>
+            <a:picLocks noGrp="1" noChangeAspect="1"/>
+          </p:cNvPicPr>
+          <p:nvPr>
+            <p:ph idx="1"/>
+          </p:nvPr>
+        </p:nvPicPr>
+        <p:blipFill>
+          <a:blip r:embed="rId2"/>
+          <a:stretch>
+            <a:fillRect/>
+          </a:stretch>
+        </p:blipFill>
+        <p:spPr>
+          <a:xfrm>
+            <a:off x="1120477" y="1584984"/>
+            <a:ext cx="9951041" cy="3681886"/>
+          </a:xfrm>
+          <a:prstGeom prst="rect">
+            <a:avLst/>
+          </a:prstGeom>
+        </p:spPr>
+      </p:pic>
+    </p:spTree>
+    <p:extLst>
+      <p:ext uri="{BB962C8B-B14F-4D97-AF65-F5344CB8AC3E}">
+        <p14:creationId xmlns:p14="http://schemas.microsoft.com/office/powerpoint/2010/main" val="3955068690"/>
+      </p:ext>
+    </p:extLst>
+  </p:cSld>
+  <p:clrMapOvr>
+    <a:overrideClrMapping bg1="dk1" tx1="lt1" bg2="dk2" tx2="lt2" accent1="accent1" accent2="accent2" accent3="accent3" accent4="accent4" accent5="accent5" accent6="accent6" hlink="hlink" folHlink="folHlink"/>
+  </p:clrMapOvr>
+</p:sld>
+</file>
+
+<file path=ppt/slides/slide16.xml><?xml version="1.0" encoding="utf-8"?>
+<p:sld xmlns:a="http://schemas.openxmlformats.org/drawingml/2006/main" xmlns:r="http://schemas.openxmlformats.org/officeDocument/2006/relationships" xmlns:p="http://schemas.openxmlformats.org/presentationml/2006/main">
+  <p:cSld>
+    <p:bg>
+      <p:bgPr>
+        <a:gradFill rotWithShape="1">
+          <a:gsLst>
+            <a:gs pos="0">
+              <a:schemeClr val="bg1">
+                <a:tint val="90000"/>
+                <a:lumMod val="110000"/>
+              </a:schemeClr>
+            </a:gs>
+            <a:gs pos="100000">
+              <a:schemeClr val="bg1">
+                <a:shade val="98000"/>
+                <a:satMod val="110000"/>
+                <a:lumMod val="86000"/>
+              </a:schemeClr>
+            </a:gs>
+          </a:gsLst>
+          <a:path path="circle">
+            <a:fillToRect l="50000" t="50000" r="100000" b="100000"/>
+          </a:path>
+        </a:gradFill>
+        <a:effectLst/>
+      </p:bgPr>
+    </p:bg>
+    <p:spTree>
+      <p:nvGrpSpPr>
+        <p:cNvPr id="1" name=""/>
+        <p:cNvGrpSpPr/>
+        <p:nvPr/>
+      </p:nvGrpSpPr>
+      <p:grpSpPr>
+        <a:xfrm>
+          <a:off x="0" y="0"/>
+          <a:ext cx="0" cy="0"/>
+          <a:chOff x="0" y="0"/>
+          <a:chExt cx="0" cy="0"/>
+        </a:xfrm>
+      </p:grpSpPr>
+      <p:sp>
+        <p:nvSpPr>
+          <p:cNvPr id="10" name="Rectangle 9">
+            <a:extLst>
+              <a:ext uri="{FF2B5EF4-FFF2-40B4-BE49-F238E27FC236}">
+                <a16:creationId xmlns:a16="http://schemas.microsoft.com/office/drawing/2014/main" id="{1DDC3EF6-2EA5-44B3-94C7-9DDA67A127D0}"/>
+              </a:ext>
+              <a:ext uri="{C183D7F6-B498-43B3-948B-1728B52AA6E4}">
+                <adec:decorative xmlns:adec="http://schemas.microsoft.com/office/drawing/2017/decorative" val="1"/>
+              </a:ext>
+            </a:extLst>
+          </p:cNvPr>
+          <p:cNvSpPr>
+            <a:spLocks noGrp="1" noRot="1" noChangeAspect="1" noMove="1" noResize="1" noEditPoints="1" noAdjustHandles="1" noChangeArrowheads="1" noChangeShapeType="1" noTextEdit="1"/>
+          </p:cNvSpPr>
+          <p:nvPr>
+            <p:extLst>
+              <p:ext uri="{386F3935-93C4-4BCD-93E2-E3B085C9AB24}">
+                <p16:designElem xmlns:p16="http://schemas.microsoft.com/office/powerpoint/2015/main" val="1"/>
+              </p:ext>
+            </p:extLst>
+          </p:nvPr>
+        </p:nvSpPr>
+        <p:spPr>
+          <a:xfrm>
+            <a:off x="446534" y="457200"/>
+            <a:ext cx="3703320" cy="94997"/>
+          </a:xfrm>
+          <a:prstGeom prst="rect">
+            <a:avLst/>
+          </a:prstGeom>
+          <a:solidFill>
+            <a:srgbClr val="465359"/>
+          </a:solidFill>
+          <a:ln>
+            <a:noFill/>
+          </a:ln>
+          <a:effectLst/>
+        </p:spPr>
+        <p:style>
+          <a:lnRef idx="1">
+            <a:schemeClr val="accent1"/>
+          </a:lnRef>
+          <a:fillRef idx="3">
+            <a:schemeClr val="accent1"/>
+          </a:fillRef>
+          <a:effectRef idx="2">
+            <a:schemeClr val="accent1"/>
+          </a:effectRef>
+          <a:fontRef idx="minor">
+            <a:schemeClr val="lt1"/>
+          </a:fontRef>
+        </p:style>
+      </p:sp>
+      <p:sp>
+        <p:nvSpPr>
+          <p:cNvPr id="12" name="Rectangle 11">
+            <a:extLst>
+              <a:ext uri="{FF2B5EF4-FFF2-40B4-BE49-F238E27FC236}">
+                <a16:creationId xmlns:a16="http://schemas.microsoft.com/office/drawing/2014/main" id="{87925A9A-E9FA-496E-9C09-7C2845E0062B}"/>
+              </a:ext>
+              <a:ext uri="{C183D7F6-B498-43B3-948B-1728B52AA6E4}">
+                <adec:decorative xmlns:adec="http://schemas.microsoft.com/office/drawing/2017/decorative" val="1"/>
+              </a:ext>
+            </a:extLst>
+          </p:cNvPr>
+          <p:cNvSpPr>
+            <a:spLocks noGrp="1" noRot="1" noChangeAspect="1" noMove="1" noResize="1" noEditPoints="1" noAdjustHandles="1" noChangeArrowheads="1" noChangeShapeType="1" noTextEdit="1"/>
+          </p:cNvSpPr>
+          <p:nvPr>
+            <p:extLst>
+              <p:ext uri="{386F3935-93C4-4BCD-93E2-E3B085C9AB24}">
+                <p16:designElem xmlns:p16="http://schemas.microsoft.com/office/powerpoint/2015/main" val="1"/>
+              </p:ext>
+            </p:extLst>
+          </p:nvPr>
+        </p:nvSpPr>
+        <p:spPr>
+          <a:xfrm>
+            <a:off x="8042147" y="453643"/>
+            <a:ext cx="3703320" cy="98554"/>
+          </a:xfrm>
+          <a:prstGeom prst="rect">
+            <a:avLst/>
+          </a:prstGeom>
+          <a:solidFill>
+            <a:srgbClr val="969FA7"/>
+          </a:solidFill>
+          <a:ln>
+            <a:noFill/>
+          </a:ln>
+          <a:effectLst/>
+        </p:spPr>
+        <p:style>
+          <a:lnRef idx="1">
+            <a:schemeClr val="accent1"/>
+          </a:lnRef>
+          <a:fillRef idx="3">
+            <a:schemeClr val="accent1"/>
+          </a:fillRef>
+          <a:effectRef idx="2">
+            <a:schemeClr val="accent1"/>
+          </a:effectRef>
+          <a:fontRef idx="minor">
+            <a:schemeClr val="lt1"/>
+          </a:fontRef>
+        </p:style>
+      </p:sp>
+      <p:sp>
+        <p:nvSpPr>
+          <p:cNvPr id="14" name="Rectangle 13">
+            <a:extLst>
+              <a:ext uri="{FF2B5EF4-FFF2-40B4-BE49-F238E27FC236}">
+                <a16:creationId xmlns:a16="http://schemas.microsoft.com/office/drawing/2014/main" id="{2073ABB4-E164-4CBF-ADFF-25552BB7913B}"/>
+              </a:ext>
+              <a:ext uri="{C183D7F6-B498-43B3-948B-1728B52AA6E4}">
+                <adec:decorative xmlns:adec="http://schemas.microsoft.com/office/drawing/2017/decorative" val="1"/>
+              </a:ext>
+            </a:extLst>
+          </p:cNvPr>
+          <p:cNvSpPr>
+            <a:spLocks noGrp="1" noRot="1" noChangeAspect="1" noMove="1" noResize="1" noEditPoints="1" noAdjustHandles="1" noChangeArrowheads="1" noChangeShapeType="1" noTextEdit="1"/>
+          </p:cNvSpPr>
+          <p:nvPr>
+            <p:extLst>
+              <p:ext uri="{386F3935-93C4-4BCD-93E2-E3B085C9AB24}">
+                <p16:designElem xmlns:p16="http://schemas.microsoft.com/office/powerpoint/2015/main" val="1"/>
+              </p:ext>
+            </p:extLst>
+          </p:nvPr>
+        </p:nvSpPr>
+        <p:spPr>
+          <a:xfrm>
+            <a:off x="4241830" y="457200"/>
+            <a:ext cx="3703320" cy="91440"/>
+          </a:xfrm>
+          <a:prstGeom prst="rect">
+            <a:avLst/>
+          </a:prstGeom>
+          <a:solidFill>
+            <a:schemeClr val="accent1"/>
+          </a:solidFill>
+          <a:ln>
+            <a:noFill/>
+          </a:ln>
+          <a:effectLst/>
+        </p:spPr>
+        <p:style>
+          <a:lnRef idx="1">
+            <a:schemeClr val="accent1"/>
+          </a:lnRef>
+          <a:fillRef idx="3">
+            <a:schemeClr val="accent1"/>
+          </a:fillRef>
+          <a:effectRef idx="2">
+            <a:schemeClr val="accent1"/>
+          </a:effectRef>
+          <a:fontRef idx="minor">
+            <a:schemeClr val="lt1"/>
+          </a:fontRef>
+        </p:style>
+      </p:sp>
+      <p:sp useBgFill="1">
+        <p:nvSpPr>
+          <p:cNvPr id="16" name="Rectangle 15">
+            <a:extLst>
+              <a:ext uri="{FF2B5EF4-FFF2-40B4-BE49-F238E27FC236}">
+                <a16:creationId xmlns:a16="http://schemas.microsoft.com/office/drawing/2014/main" id="{20C97E5C-C165-417B-BBDE-6701E226BE3D}"/>
+              </a:ext>
+              <a:ext uri="{C183D7F6-B498-43B3-948B-1728B52AA6E4}">
+                <adec:decorative xmlns:adec="http://schemas.microsoft.com/office/drawing/2017/decorative" val="1"/>
+              </a:ext>
+            </a:extLst>
+          </p:cNvPr>
+          <p:cNvSpPr>
+            <a:spLocks noGrp="1" noRot="1" noChangeAspect="1" noMove="1" noResize="1" noEditPoints="1" noAdjustHandles="1" noChangeArrowheads="1" noChangeShapeType="1" noTextEdit="1"/>
+          </p:cNvSpPr>
+          <p:nvPr>
+            <p:extLst>
+              <p:ext uri="{386F3935-93C4-4BCD-93E2-E3B085C9AB24}">
+                <p16:designElem xmlns:p16="http://schemas.microsoft.com/office/powerpoint/2015/main" val="1"/>
+              </p:ext>
+            </p:extLst>
+          </p:nvPr>
+        </p:nvSpPr>
+        <p:spPr>
+          <a:xfrm>
+            <a:off x="0" y="0"/>
+            <a:ext cx="12192000" cy="6858000"/>
+          </a:xfrm>
+          <a:prstGeom prst="rect">
+            <a:avLst/>
+          </a:prstGeom>
+          <a:ln>
+            <a:noFill/>
+          </a:ln>
+        </p:spPr>
+        <p:style>
+          <a:lnRef idx="2">
+            <a:schemeClr val="accent1">
+              <a:shade val="50000"/>
+            </a:schemeClr>
+          </a:lnRef>
+          <a:fillRef idx="1">
+            <a:schemeClr val="accent1"/>
+          </a:fillRef>
+          <a:effectRef idx="0">
+            <a:schemeClr val="accent1"/>
+          </a:effectRef>
+          <a:fontRef idx="minor">
+            <a:schemeClr val="lt1"/>
+          </a:fontRef>
+        </p:style>
+        <p:txBody>
+          <a:bodyPr rtlCol="0" anchor="ctr"/>
+          <a:lstStyle/>
+          <a:p>
+            <a:pPr algn="ctr"/>
+            <a:endParaRPr lang="en-US"/>
+          </a:p>
+        </p:txBody>
+      </p:sp>
+      <p:sp>
+        <p:nvSpPr>
+          <p:cNvPr id="18" name="Rectangle 17">
+            <a:extLst>
+              <a:ext uri="{FF2B5EF4-FFF2-40B4-BE49-F238E27FC236}">
+                <a16:creationId xmlns:a16="http://schemas.microsoft.com/office/drawing/2014/main" id="{95D0E1C6-221C-4835-B0D4-24184F6B6E21}"/>
+              </a:ext>
+              <a:ext uri="{C183D7F6-B498-43B3-948B-1728B52AA6E4}">
+                <adec:decorative xmlns:adec="http://schemas.microsoft.com/office/drawing/2017/decorative" val="1"/>
+              </a:ext>
+            </a:extLst>
+          </p:cNvPr>
+          <p:cNvSpPr>
+            <a:spLocks noGrp="1" noRot="1" noChangeAspect="1" noMove="1" noResize="1" noEditPoints="1" noAdjustHandles="1" noChangeArrowheads="1" noChangeShapeType="1" noTextEdit="1"/>
+          </p:cNvSpPr>
+          <p:nvPr>
+            <p:extLst>
+              <p:ext uri="{386F3935-93C4-4BCD-93E2-E3B085C9AB24}">
+                <p16:designElem xmlns:p16="http://schemas.microsoft.com/office/powerpoint/2015/main" val="1"/>
+              </p:ext>
+            </p:extLst>
+          </p:nvPr>
+        </p:nvSpPr>
+        <p:spPr>
+          <a:xfrm>
+            <a:off x="477012" y="480060"/>
+            <a:ext cx="11237976" cy="5897880"/>
+          </a:xfrm>
+          <a:prstGeom prst="rect">
+            <a:avLst/>
+          </a:prstGeom>
+          <a:noFill/>
+          <a:ln>
+            <a:solidFill>
               <a:srgbClr val="5EA5FA"/>
             </a:solidFill>
           </a:ln>
@@ -6273,7 +7775,7 @@
 </p:sld>
 </file>
 
-<file path=ppt/slides/slide14.xml><?xml version="1.0" encoding="utf-8"?>
+<file path=ppt/slides/slide17.xml><?xml version="1.0" encoding="utf-8"?>
 <p:sld xmlns:a="http://schemas.openxmlformats.org/drawingml/2006/main" xmlns:r="http://schemas.openxmlformats.org/officeDocument/2006/relationships" xmlns:p="http://schemas.openxmlformats.org/presentationml/2006/main">
   <p:cSld>
     <p:bg>
@@ -6614,7 +8116,7 @@
 </p:sld>
 </file>
 
-<file path=ppt/slides/slide15.xml><?xml version="1.0" encoding="utf-8"?>
+<file path=ppt/slides/slide18.xml><?xml version="1.0" encoding="utf-8"?>
 <p:sld xmlns:a="http://schemas.openxmlformats.org/drawingml/2006/main" xmlns:r="http://schemas.openxmlformats.org/officeDocument/2006/relationships" xmlns:p="http://schemas.openxmlformats.org/presentationml/2006/main">
   <p:cSld>
     <p:bg>
@@ -11454,7 +12956,7 @@
                   <a:schemeClr val="bg1"/>
                 </a:solidFill>
               </a:rPr>
-              <a:t>Other Games</a:t>
+              <a:t>Cases</a:t>
             </a:r>
           </a:p>
         </p:txBody>
@@ -11462,7 +12964,7 @@
     </p:spTree>
     <p:extLst>
       <p:ext uri="{BB962C8B-B14F-4D97-AF65-F5344CB8AC3E}">
-        <p14:creationId xmlns:p14="http://schemas.microsoft.com/office/powerpoint/2010/main" val="3066787884"/>
+        <p14:creationId xmlns:p14="http://schemas.microsoft.com/office/powerpoint/2010/main" val="3344690155"/>
       </p:ext>
     </p:extLst>
   </p:cSld>

</xml_diff>